<commit_message>
clarify and add annimation
</commit_message>
<xml_diff>
--- a/Recursion.pptx
+++ b/Recursion.pptx
@@ -4,6 +4,9 @@
   <p:sldMasterIdLst>
     <p:sldMasterId id="2147483672" r:id="rId1"/>
   </p:sldMasterIdLst>
+  <p:notesMasterIdLst>
+    <p:notesMasterId r:id="rId12"/>
+  </p:notesMasterIdLst>
   <p:sldIdLst>
     <p:sldId id="256" r:id="rId2"/>
     <p:sldId id="262" r:id="rId3"/>
@@ -121,6 +124,355 @@
 </p:presentation>
 </file>
 
+<file path=ppt/notesMasters/notesMaster1.xml><?xml version="1.0" encoding="utf-8"?>
+<p:notesMaster xmlns:a="http://schemas.openxmlformats.org/drawingml/2006/main" xmlns:r="http://schemas.openxmlformats.org/officeDocument/2006/relationships" xmlns:p="http://schemas.openxmlformats.org/presentationml/2006/main">
+  <p:cSld>
+    <p:bg>
+      <p:bgRef idx="1001">
+        <a:schemeClr val="bg1"/>
+      </p:bgRef>
+    </p:bg>
+    <p:spTree>
+      <p:nvGrpSpPr>
+        <p:cNvPr id="1" name=""/>
+        <p:cNvGrpSpPr/>
+        <p:nvPr/>
+      </p:nvGrpSpPr>
+      <p:grpSpPr>
+        <a:xfrm>
+          <a:off x="0" y="0"/>
+          <a:ext cx="0" cy="0"/>
+          <a:chOff x="0" y="0"/>
+          <a:chExt cx="0" cy="0"/>
+        </a:xfrm>
+      </p:grpSpPr>
+      <p:sp>
+        <p:nvSpPr>
+          <p:cNvPr id="2" name="Header Placeholder 1"/>
+          <p:cNvSpPr>
+            <a:spLocks noGrp="1"/>
+          </p:cNvSpPr>
+          <p:nvPr>
+            <p:ph type="hdr" sz="quarter"/>
+          </p:nvPr>
+        </p:nvSpPr>
+        <p:spPr>
+          <a:xfrm>
+            <a:off x="0" y="0"/>
+            <a:ext cx="2971800" cy="458788"/>
+          </a:xfrm>
+          <a:prstGeom prst="rect">
+            <a:avLst/>
+          </a:prstGeom>
+        </p:spPr>
+        <p:txBody>
+          <a:bodyPr vert="horz" lIns="91440" tIns="45720" rIns="91440" bIns="45720" rtlCol="0"/>
+          <a:lstStyle>
+            <a:lvl1pPr algn="l">
+              <a:defRPr sz="1200"/>
+            </a:lvl1pPr>
+          </a:lstStyle>
+          <a:p>
+            <a:endParaRPr lang="en-US" dirty="0"/>
+          </a:p>
+        </p:txBody>
+      </p:sp>
+      <p:sp>
+        <p:nvSpPr>
+          <p:cNvPr id="3" name="Date Placeholder 2"/>
+          <p:cNvSpPr>
+            <a:spLocks noGrp="1"/>
+          </p:cNvSpPr>
+          <p:nvPr>
+            <p:ph type="dt" idx="1"/>
+          </p:nvPr>
+        </p:nvSpPr>
+        <p:spPr>
+          <a:xfrm>
+            <a:off x="3884613" y="0"/>
+            <a:ext cx="2971800" cy="458788"/>
+          </a:xfrm>
+          <a:prstGeom prst="rect">
+            <a:avLst/>
+          </a:prstGeom>
+        </p:spPr>
+        <p:txBody>
+          <a:bodyPr vert="horz" lIns="91440" tIns="45720" rIns="91440" bIns="45720" rtlCol="0"/>
+          <a:lstStyle>
+            <a:lvl1pPr algn="r">
+              <a:defRPr sz="1200"/>
+            </a:lvl1pPr>
+          </a:lstStyle>
+          <a:p>
+            <a:fld id="{22E3DE2D-CFF6-4186-A485-014B1281820F}" type="datetimeFigureOut">
+              <a:rPr lang="en-US" smtClean="0"/>
+              <a:t>8/22/2021</a:t>
+            </a:fld>
+            <a:endParaRPr lang="en-US" dirty="0"/>
+          </a:p>
+        </p:txBody>
+      </p:sp>
+      <p:sp>
+        <p:nvSpPr>
+          <p:cNvPr id="4" name="Slide Image Placeholder 3"/>
+          <p:cNvSpPr>
+            <a:spLocks noGrp="1" noRot="1" noChangeAspect="1"/>
+          </p:cNvSpPr>
+          <p:nvPr>
+            <p:ph type="sldImg" idx="2"/>
+          </p:nvPr>
+        </p:nvSpPr>
+        <p:spPr>
+          <a:xfrm>
+            <a:off x="685800" y="1143000"/>
+            <a:ext cx="5486400" cy="3086100"/>
+          </a:xfrm>
+          <a:prstGeom prst="rect">
+            <a:avLst/>
+          </a:prstGeom>
+          <a:noFill/>
+          <a:ln w="12700">
+            <a:solidFill>
+              <a:prstClr val="black"/>
+            </a:solidFill>
+          </a:ln>
+        </p:spPr>
+        <p:txBody>
+          <a:bodyPr vert="horz" lIns="91440" tIns="45720" rIns="91440" bIns="45720" rtlCol="0" anchor="ctr"/>
+          <a:lstStyle/>
+          <a:p>
+            <a:endParaRPr lang="en-US" dirty="0"/>
+          </a:p>
+        </p:txBody>
+      </p:sp>
+      <p:sp>
+        <p:nvSpPr>
+          <p:cNvPr id="5" name="Notes Placeholder 4"/>
+          <p:cNvSpPr>
+            <a:spLocks noGrp="1"/>
+          </p:cNvSpPr>
+          <p:nvPr>
+            <p:ph type="body" sz="quarter" idx="3"/>
+          </p:nvPr>
+        </p:nvSpPr>
+        <p:spPr>
+          <a:xfrm>
+            <a:off x="685800" y="4400550"/>
+            <a:ext cx="5486400" cy="3600450"/>
+          </a:xfrm>
+          <a:prstGeom prst="rect">
+            <a:avLst/>
+          </a:prstGeom>
+        </p:spPr>
+        <p:txBody>
+          <a:bodyPr vert="horz" lIns="91440" tIns="45720" rIns="91440" bIns="45720" rtlCol="0"/>
+          <a:lstStyle/>
+          <a:p>
+            <a:pPr lvl="0"/>
+            <a:r>
+              <a:rPr lang="en-US"/>
+              <a:t>Click to edit Master text styles</a:t>
+            </a:r>
+          </a:p>
+          <a:p>
+            <a:pPr lvl="1"/>
+            <a:r>
+              <a:rPr lang="en-US"/>
+              <a:t>Second level</a:t>
+            </a:r>
+          </a:p>
+          <a:p>
+            <a:pPr lvl="2"/>
+            <a:r>
+              <a:rPr lang="en-US"/>
+              <a:t>Third level</a:t>
+            </a:r>
+          </a:p>
+          <a:p>
+            <a:pPr lvl="3"/>
+            <a:r>
+              <a:rPr lang="en-US"/>
+              <a:t>Fourth level</a:t>
+            </a:r>
+          </a:p>
+          <a:p>
+            <a:pPr lvl="4"/>
+            <a:r>
+              <a:rPr lang="en-US"/>
+              <a:t>Fifth level</a:t>
+            </a:r>
+          </a:p>
+        </p:txBody>
+      </p:sp>
+      <p:sp>
+        <p:nvSpPr>
+          <p:cNvPr id="6" name="Footer Placeholder 5"/>
+          <p:cNvSpPr>
+            <a:spLocks noGrp="1"/>
+          </p:cNvSpPr>
+          <p:nvPr>
+            <p:ph type="ftr" sz="quarter" idx="4"/>
+          </p:nvPr>
+        </p:nvSpPr>
+        <p:spPr>
+          <a:xfrm>
+            <a:off x="0" y="8685213"/>
+            <a:ext cx="2971800" cy="458787"/>
+          </a:xfrm>
+          <a:prstGeom prst="rect">
+            <a:avLst/>
+          </a:prstGeom>
+        </p:spPr>
+        <p:txBody>
+          <a:bodyPr vert="horz" lIns="91440" tIns="45720" rIns="91440" bIns="45720" rtlCol="0" anchor="b"/>
+          <a:lstStyle>
+            <a:lvl1pPr algn="l">
+              <a:defRPr sz="1200"/>
+            </a:lvl1pPr>
+          </a:lstStyle>
+          <a:p>
+            <a:endParaRPr lang="en-US" dirty="0"/>
+          </a:p>
+        </p:txBody>
+      </p:sp>
+      <p:sp>
+        <p:nvSpPr>
+          <p:cNvPr id="7" name="Slide Number Placeholder 6"/>
+          <p:cNvSpPr>
+            <a:spLocks noGrp="1"/>
+          </p:cNvSpPr>
+          <p:nvPr>
+            <p:ph type="sldNum" sz="quarter" idx="5"/>
+          </p:nvPr>
+        </p:nvSpPr>
+        <p:spPr>
+          <a:xfrm>
+            <a:off x="3884613" y="8685213"/>
+            <a:ext cx="2971800" cy="458787"/>
+          </a:xfrm>
+          <a:prstGeom prst="rect">
+            <a:avLst/>
+          </a:prstGeom>
+        </p:spPr>
+        <p:txBody>
+          <a:bodyPr vert="horz" lIns="91440" tIns="45720" rIns="91440" bIns="45720" rtlCol="0" anchor="b"/>
+          <a:lstStyle>
+            <a:lvl1pPr algn="r">
+              <a:defRPr sz="1200"/>
+            </a:lvl1pPr>
+          </a:lstStyle>
+          <a:p>
+            <a:fld id="{142869DC-CC80-445D-9579-0BC3CC473947}" type="slidenum">
+              <a:rPr lang="en-US" smtClean="0"/>
+              <a:t>‹#›</a:t>
+            </a:fld>
+            <a:endParaRPr lang="en-US" dirty="0"/>
+          </a:p>
+        </p:txBody>
+      </p:sp>
+    </p:spTree>
+    <p:extLst>
+      <p:ext uri="{BB962C8B-B14F-4D97-AF65-F5344CB8AC3E}">
+        <p14:creationId xmlns:p14="http://schemas.microsoft.com/office/powerpoint/2010/main" val="562022998"/>
+      </p:ext>
+    </p:extLst>
+  </p:cSld>
+  <p:clrMap bg1="lt1" tx1="dk1" bg2="lt2" tx2="dk2" accent1="accent1" accent2="accent2" accent3="accent3" accent4="accent4" accent5="accent5" accent6="accent6" hlink="hlink" folHlink="folHlink"/>
+  <p:notesStyle>
+    <a:lvl1pPr marL="0" algn="l" defTabSz="914400" rtl="0" eaLnBrk="1" latinLnBrk="0" hangingPunct="1">
+      <a:defRPr sz="1200" kern="1200">
+        <a:solidFill>
+          <a:schemeClr val="tx1"/>
+        </a:solidFill>
+        <a:latin typeface="+mn-lt"/>
+        <a:ea typeface="+mn-ea"/>
+        <a:cs typeface="+mn-cs"/>
+      </a:defRPr>
+    </a:lvl1pPr>
+    <a:lvl2pPr marL="457200" algn="l" defTabSz="914400" rtl="0" eaLnBrk="1" latinLnBrk="0" hangingPunct="1">
+      <a:defRPr sz="1200" kern="1200">
+        <a:solidFill>
+          <a:schemeClr val="tx1"/>
+        </a:solidFill>
+        <a:latin typeface="+mn-lt"/>
+        <a:ea typeface="+mn-ea"/>
+        <a:cs typeface="+mn-cs"/>
+      </a:defRPr>
+    </a:lvl2pPr>
+    <a:lvl3pPr marL="914400" algn="l" defTabSz="914400" rtl="0" eaLnBrk="1" latinLnBrk="0" hangingPunct="1">
+      <a:defRPr sz="1200" kern="1200">
+        <a:solidFill>
+          <a:schemeClr val="tx1"/>
+        </a:solidFill>
+        <a:latin typeface="+mn-lt"/>
+        <a:ea typeface="+mn-ea"/>
+        <a:cs typeface="+mn-cs"/>
+      </a:defRPr>
+    </a:lvl3pPr>
+    <a:lvl4pPr marL="1371600" algn="l" defTabSz="914400" rtl="0" eaLnBrk="1" latinLnBrk="0" hangingPunct="1">
+      <a:defRPr sz="1200" kern="1200">
+        <a:solidFill>
+          <a:schemeClr val="tx1"/>
+        </a:solidFill>
+        <a:latin typeface="+mn-lt"/>
+        <a:ea typeface="+mn-ea"/>
+        <a:cs typeface="+mn-cs"/>
+      </a:defRPr>
+    </a:lvl4pPr>
+    <a:lvl5pPr marL="1828800" algn="l" defTabSz="914400" rtl="0" eaLnBrk="1" latinLnBrk="0" hangingPunct="1">
+      <a:defRPr sz="1200" kern="1200">
+        <a:solidFill>
+          <a:schemeClr val="tx1"/>
+        </a:solidFill>
+        <a:latin typeface="+mn-lt"/>
+        <a:ea typeface="+mn-ea"/>
+        <a:cs typeface="+mn-cs"/>
+      </a:defRPr>
+    </a:lvl5pPr>
+    <a:lvl6pPr marL="2286000" algn="l" defTabSz="914400" rtl="0" eaLnBrk="1" latinLnBrk="0" hangingPunct="1">
+      <a:defRPr sz="1200" kern="1200">
+        <a:solidFill>
+          <a:schemeClr val="tx1"/>
+        </a:solidFill>
+        <a:latin typeface="+mn-lt"/>
+        <a:ea typeface="+mn-ea"/>
+        <a:cs typeface="+mn-cs"/>
+      </a:defRPr>
+    </a:lvl6pPr>
+    <a:lvl7pPr marL="2743200" algn="l" defTabSz="914400" rtl="0" eaLnBrk="1" latinLnBrk="0" hangingPunct="1">
+      <a:defRPr sz="1200" kern="1200">
+        <a:solidFill>
+          <a:schemeClr val="tx1"/>
+        </a:solidFill>
+        <a:latin typeface="+mn-lt"/>
+        <a:ea typeface="+mn-ea"/>
+        <a:cs typeface="+mn-cs"/>
+      </a:defRPr>
+    </a:lvl7pPr>
+    <a:lvl8pPr marL="3200400" algn="l" defTabSz="914400" rtl="0" eaLnBrk="1" latinLnBrk="0" hangingPunct="1">
+      <a:defRPr sz="1200" kern="1200">
+        <a:solidFill>
+          <a:schemeClr val="tx1"/>
+        </a:solidFill>
+        <a:latin typeface="+mn-lt"/>
+        <a:ea typeface="+mn-ea"/>
+        <a:cs typeface="+mn-cs"/>
+      </a:defRPr>
+    </a:lvl8pPr>
+    <a:lvl9pPr marL="3657600" algn="l" defTabSz="914400" rtl="0" eaLnBrk="1" latinLnBrk="0" hangingPunct="1">
+      <a:defRPr sz="1200" kern="1200">
+        <a:solidFill>
+          <a:schemeClr val="tx1"/>
+        </a:solidFill>
+        <a:latin typeface="+mn-lt"/>
+        <a:ea typeface="+mn-ea"/>
+        <a:cs typeface="+mn-cs"/>
+      </a:defRPr>
+    </a:lvl9pPr>
+  </p:notesStyle>
+</p:notesMaster>
+</file>
+
 <file path=ppt/slideLayouts/slideLayout1.xml><?xml version="1.0" encoding="utf-8"?>
 <p:sldLayout xmlns:a="http://schemas.openxmlformats.org/drawingml/2006/main" xmlns:r="http://schemas.openxmlformats.org/officeDocument/2006/relationships" xmlns:p="http://schemas.openxmlformats.org/presentationml/2006/main" type="title" preserve="1">
   <p:cSld name="Title Slide">
@@ -266,9 +618,9 @@
           <a:bodyPr/>
           <a:lstStyle/>
           <a:p>
-            <a:fld id="{FFC33FC7-B237-4DA7-BDBD-A8BFE455B656}" type="datetimeFigureOut">
+            <a:fld id="{4E6BD2DE-AB0E-4EC4-9F44-3473AE8DD09C}" type="datetime1">
               <a:rPr lang="en-US" smtClean="0"/>
-              <a:t>8/18/2021</a:t>
+              <a:t>8/22/2021</a:t>
             </a:fld>
             <a:endParaRPr lang="en-US" dirty="0"/>
           </a:p>
@@ -295,6 +647,10 @@
           <a:bodyPr/>
           <a:lstStyle/>
           <a:p>
+            <a:r>
+              <a:rPr lang="en-US"/>
+              <a:t>https://github.com/avifarah/Recurson</a:t>
+            </a:r>
             <a:endParaRPr lang="en-US" dirty="0"/>
           </a:p>
         </p:txBody>
@@ -464,9 +820,9 @@
           <a:bodyPr/>
           <a:lstStyle/>
           <a:p>
-            <a:fld id="{FFC33FC7-B237-4DA7-BDBD-A8BFE455B656}" type="datetimeFigureOut">
+            <a:fld id="{397F5496-3091-4B5B-8DD5-67D3D7FC764D}" type="datetime1">
               <a:rPr lang="en-US" smtClean="0"/>
-              <a:t>8/18/2021</a:t>
+              <a:t>8/22/2021</a:t>
             </a:fld>
             <a:endParaRPr lang="en-US" dirty="0"/>
           </a:p>
@@ -493,6 +849,10 @@
           <a:bodyPr/>
           <a:lstStyle/>
           <a:p>
+            <a:r>
+              <a:rPr lang="en-US"/>
+              <a:t>https://github.com/avifarah/Recurson</a:t>
+            </a:r>
             <a:endParaRPr lang="en-US" dirty="0"/>
           </a:p>
         </p:txBody>
@@ -672,9 +1032,9 @@
           <a:bodyPr/>
           <a:lstStyle/>
           <a:p>
-            <a:fld id="{FFC33FC7-B237-4DA7-BDBD-A8BFE455B656}" type="datetimeFigureOut">
+            <a:fld id="{FA91CA60-89FB-47AC-9004-0795A1301801}" type="datetime1">
               <a:rPr lang="en-US" smtClean="0"/>
-              <a:t>8/18/2021</a:t>
+              <a:t>8/22/2021</a:t>
             </a:fld>
             <a:endParaRPr lang="en-US" dirty="0"/>
           </a:p>
@@ -701,6 +1061,10 @@
           <a:bodyPr/>
           <a:lstStyle/>
           <a:p>
+            <a:r>
+              <a:rPr lang="en-US"/>
+              <a:t>https://github.com/avifarah/Recurson</a:t>
+            </a:r>
             <a:endParaRPr lang="en-US" dirty="0"/>
           </a:p>
         </p:txBody>
@@ -870,9 +1234,9 @@
           <a:bodyPr/>
           <a:lstStyle/>
           <a:p>
-            <a:fld id="{FFC33FC7-B237-4DA7-BDBD-A8BFE455B656}" type="datetimeFigureOut">
+            <a:fld id="{CAFCFD8F-DC83-4F6F-9F64-A05441656A74}" type="datetime1">
               <a:rPr lang="en-US" smtClean="0"/>
-              <a:t>8/18/2021</a:t>
+              <a:t>8/22/2021</a:t>
             </a:fld>
             <a:endParaRPr lang="en-US" dirty="0"/>
           </a:p>
@@ -899,6 +1263,10 @@
           <a:bodyPr/>
           <a:lstStyle/>
           <a:p>
+            <a:r>
+              <a:rPr lang="en-US"/>
+              <a:t>https://github.com/avifarah/Recurson</a:t>
+            </a:r>
             <a:endParaRPr lang="en-US" dirty="0"/>
           </a:p>
         </p:txBody>
@@ -1145,9 +1513,9 @@
           <a:bodyPr/>
           <a:lstStyle/>
           <a:p>
-            <a:fld id="{FFC33FC7-B237-4DA7-BDBD-A8BFE455B656}" type="datetimeFigureOut">
+            <a:fld id="{8938B9D1-8B1B-433F-A4CB-461281CA8ADE}" type="datetime1">
               <a:rPr lang="en-US" smtClean="0"/>
-              <a:t>8/18/2021</a:t>
+              <a:t>8/22/2021</a:t>
             </a:fld>
             <a:endParaRPr lang="en-US" dirty="0"/>
           </a:p>
@@ -1174,6 +1542,10 @@
           <a:bodyPr/>
           <a:lstStyle/>
           <a:p>
+            <a:r>
+              <a:rPr lang="en-US"/>
+              <a:t>https://github.com/avifarah/Recurson</a:t>
+            </a:r>
             <a:endParaRPr lang="en-US" dirty="0"/>
           </a:p>
         </p:txBody>
@@ -1410,9 +1782,9 @@
           <a:bodyPr/>
           <a:lstStyle/>
           <a:p>
-            <a:fld id="{FFC33FC7-B237-4DA7-BDBD-A8BFE455B656}" type="datetimeFigureOut">
+            <a:fld id="{04EC4C3F-A240-4441-9F04-A682CB663ED3}" type="datetime1">
               <a:rPr lang="en-US" smtClean="0"/>
-              <a:t>8/18/2021</a:t>
+              <a:t>8/22/2021</a:t>
             </a:fld>
             <a:endParaRPr lang="en-US" dirty="0"/>
           </a:p>
@@ -1439,6 +1811,10 @@
           <a:bodyPr/>
           <a:lstStyle/>
           <a:p>
+            <a:r>
+              <a:rPr lang="en-US"/>
+              <a:t>https://github.com/avifarah/Recurson</a:t>
+            </a:r>
             <a:endParaRPr lang="en-US" dirty="0"/>
           </a:p>
         </p:txBody>
@@ -1822,9 +2198,9 @@
           <a:bodyPr/>
           <a:lstStyle/>
           <a:p>
-            <a:fld id="{FFC33FC7-B237-4DA7-BDBD-A8BFE455B656}" type="datetimeFigureOut">
+            <a:fld id="{57016B8D-88DF-470A-99E2-2CDC3315A2BC}" type="datetime1">
               <a:rPr lang="en-US" smtClean="0"/>
-              <a:t>8/18/2021</a:t>
+              <a:t>8/22/2021</a:t>
             </a:fld>
             <a:endParaRPr lang="en-US" dirty="0"/>
           </a:p>
@@ -1851,6 +2227,10 @@
           <a:bodyPr/>
           <a:lstStyle/>
           <a:p>
+            <a:r>
+              <a:rPr lang="en-US"/>
+              <a:t>https://github.com/avifarah/Recurson</a:t>
+            </a:r>
             <a:endParaRPr lang="en-US" dirty="0"/>
           </a:p>
         </p:txBody>
@@ -1963,9 +2343,9 @@
           <a:bodyPr/>
           <a:lstStyle/>
           <a:p>
-            <a:fld id="{FFC33FC7-B237-4DA7-BDBD-A8BFE455B656}" type="datetimeFigureOut">
+            <a:fld id="{B9148364-5DBA-4CE0-807E-4D3E48CA6791}" type="datetime1">
               <a:rPr lang="en-US" smtClean="0"/>
-              <a:t>8/18/2021</a:t>
+              <a:t>8/22/2021</a:t>
             </a:fld>
             <a:endParaRPr lang="en-US" dirty="0"/>
           </a:p>
@@ -1992,6 +2372,10 @@
           <a:bodyPr/>
           <a:lstStyle/>
           <a:p>
+            <a:r>
+              <a:rPr lang="en-US"/>
+              <a:t>https://github.com/avifarah/Recurson</a:t>
+            </a:r>
             <a:endParaRPr lang="en-US" dirty="0"/>
           </a:p>
         </p:txBody>
@@ -2076,9 +2460,9 @@
           <a:bodyPr/>
           <a:lstStyle/>
           <a:p>
-            <a:fld id="{FFC33FC7-B237-4DA7-BDBD-A8BFE455B656}" type="datetimeFigureOut">
+            <a:fld id="{69C85018-EED3-4584-AF03-6EC1E37102B5}" type="datetime1">
               <a:rPr lang="en-US" smtClean="0"/>
-              <a:t>8/18/2021</a:t>
+              <a:t>8/22/2021</a:t>
             </a:fld>
             <a:endParaRPr lang="en-US" dirty="0"/>
           </a:p>
@@ -2105,6 +2489,10 @@
           <a:bodyPr/>
           <a:lstStyle/>
           <a:p>
+            <a:r>
+              <a:rPr lang="en-US"/>
+              <a:t>https://github.com/avifarah/Recurson</a:t>
+            </a:r>
             <a:endParaRPr lang="en-US" dirty="0"/>
           </a:p>
         </p:txBody>
@@ -2387,9 +2775,9 @@
           <a:bodyPr/>
           <a:lstStyle/>
           <a:p>
-            <a:fld id="{FFC33FC7-B237-4DA7-BDBD-A8BFE455B656}" type="datetimeFigureOut">
+            <a:fld id="{E557030F-424A-461D-BAD3-793DB96A4027}" type="datetime1">
               <a:rPr lang="en-US" smtClean="0"/>
-              <a:t>8/18/2021</a:t>
+              <a:t>8/22/2021</a:t>
             </a:fld>
             <a:endParaRPr lang="en-US" dirty="0"/>
           </a:p>
@@ -2416,6 +2804,10 @@
           <a:bodyPr/>
           <a:lstStyle/>
           <a:p>
+            <a:r>
+              <a:rPr lang="en-US"/>
+              <a:t>https://github.com/avifarah/Recurson</a:t>
+            </a:r>
             <a:endParaRPr lang="en-US" dirty="0"/>
           </a:p>
         </p:txBody>
@@ -2675,9 +3067,9 @@
           <a:bodyPr/>
           <a:lstStyle/>
           <a:p>
-            <a:fld id="{FFC33FC7-B237-4DA7-BDBD-A8BFE455B656}" type="datetimeFigureOut">
+            <a:fld id="{9D1081C4-BBEF-47D9-B2C5-34ACDE947E83}" type="datetime1">
               <a:rPr lang="en-US" smtClean="0"/>
-              <a:t>8/18/2021</a:t>
+              <a:t>8/22/2021</a:t>
             </a:fld>
             <a:endParaRPr lang="en-US" dirty="0"/>
           </a:p>
@@ -2704,6 +3096,10 @@
           <a:bodyPr/>
           <a:lstStyle/>
           <a:p>
+            <a:r>
+              <a:rPr lang="en-US"/>
+              <a:t>https://github.com/avifarah/Recurson</a:t>
+            </a:r>
             <a:endParaRPr lang="en-US" dirty="0"/>
           </a:p>
         </p:txBody>
@@ -2916,9 +3312,9 @@
             </a:lvl1pPr>
           </a:lstStyle>
           <a:p>
-            <a:fld id="{FFC33FC7-B237-4DA7-BDBD-A8BFE455B656}" type="datetimeFigureOut">
+            <a:fld id="{C54ECCEC-1148-47FD-85D3-B4FBD873B9E1}" type="datetime1">
               <a:rPr lang="en-US" smtClean="0"/>
-              <a:t>8/18/2021</a:t>
+              <a:t>8/22/2021</a:t>
             </a:fld>
             <a:endParaRPr lang="en-US" dirty="0"/>
           </a:p>
@@ -2963,6 +3359,10 @@
             </a:lvl1pPr>
           </a:lstStyle>
           <a:p>
+            <a:r>
+              <a:rPr lang="en-US"/>
+              <a:t>https://github.com/avifarah/Recurson</a:t>
+            </a:r>
             <a:endParaRPr lang="en-US" dirty="0"/>
           </a:p>
         </p:txBody>
@@ -3035,6 +3435,7 @@
     <p:sldLayoutId id="2147483682" r:id="rId10"/>
     <p:sldLayoutId id="2147483683" r:id="rId11"/>
   </p:sldLayoutIdLst>
+  <p:hf hdr="0" dt="0"/>
   <p:txStyles>
     <p:titleStyle>
       <a:lvl1pPr algn="l" defTabSz="914400" rtl="0" eaLnBrk="1" latinLnBrk="0" hangingPunct="1">
@@ -3426,6 +3827,64 @@
               </a:rPr>
               <a:t>avifarah@hotmail.com</a:t>
             </a:r>
+            <a:endParaRPr lang="en-US" dirty="0"/>
+          </a:p>
+        </p:txBody>
+      </p:sp>
+      <p:sp>
+        <p:nvSpPr>
+          <p:cNvPr id="4" name="Footer Placeholder 3">
+            <a:extLst>
+              <a:ext uri="{FF2B5EF4-FFF2-40B4-BE49-F238E27FC236}">
+                <a16:creationId xmlns:a16="http://schemas.microsoft.com/office/drawing/2014/main" id="{3CCDB002-EC79-4A08-8672-E8487FC9A423}"/>
+              </a:ext>
+            </a:extLst>
+          </p:cNvPr>
+          <p:cNvSpPr>
+            <a:spLocks noGrp="1"/>
+          </p:cNvSpPr>
+          <p:nvPr>
+            <p:ph type="ftr" sz="quarter" idx="11"/>
+          </p:nvPr>
+        </p:nvSpPr>
+        <p:spPr/>
+        <p:txBody>
+          <a:bodyPr/>
+          <a:lstStyle/>
+          <a:p>
+            <a:r>
+              <a:rPr lang="en-US"/>
+              <a:t>https://github.com/avifarah/Recurson</a:t>
+            </a:r>
+            <a:endParaRPr lang="en-US" dirty="0"/>
+          </a:p>
+        </p:txBody>
+      </p:sp>
+      <p:sp>
+        <p:nvSpPr>
+          <p:cNvPr id="5" name="Slide Number Placeholder 4">
+            <a:extLst>
+              <a:ext uri="{FF2B5EF4-FFF2-40B4-BE49-F238E27FC236}">
+                <a16:creationId xmlns:a16="http://schemas.microsoft.com/office/drawing/2014/main" id="{275B91B2-A300-460E-9E58-4457FB65F2AB}"/>
+              </a:ext>
+            </a:extLst>
+          </p:cNvPr>
+          <p:cNvSpPr>
+            <a:spLocks noGrp="1"/>
+          </p:cNvSpPr>
+          <p:nvPr>
+            <p:ph type="sldNum" sz="quarter" idx="12"/>
+          </p:nvPr>
+        </p:nvSpPr>
+        <p:spPr/>
+        <p:txBody>
+          <a:bodyPr/>
+          <a:lstStyle/>
+          <a:p>
+            <a:fld id="{AED3D424-D5FA-4721-A71E-77CBBB5C48D0}" type="slidenum">
+              <a:rPr lang="en-US" smtClean="0"/>
+              <a:t>1</a:t>
+            </a:fld>
             <a:endParaRPr lang="en-US" dirty="0"/>
           </a:p>
         </p:txBody>
@@ -4384,6 +4843,64 @@
           </p:sp>
         </mc:Fallback>
       </mc:AlternateContent>
+      <p:sp>
+        <p:nvSpPr>
+          <p:cNvPr id="4" name="Footer Placeholder 3">
+            <a:extLst>
+              <a:ext uri="{FF2B5EF4-FFF2-40B4-BE49-F238E27FC236}">
+                <a16:creationId xmlns:a16="http://schemas.microsoft.com/office/drawing/2014/main" id="{C851F13C-8FE3-455A-8E88-307521E13D70}"/>
+              </a:ext>
+            </a:extLst>
+          </p:cNvPr>
+          <p:cNvSpPr>
+            <a:spLocks noGrp="1"/>
+          </p:cNvSpPr>
+          <p:nvPr>
+            <p:ph type="ftr" sz="quarter" idx="11"/>
+          </p:nvPr>
+        </p:nvSpPr>
+        <p:spPr/>
+        <p:txBody>
+          <a:bodyPr/>
+          <a:lstStyle/>
+          <a:p>
+            <a:r>
+              <a:rPr lang="en-US"/>
+              <a:t>https://github.com/avifarah/Recurson</a:t>
+            </a:r>
+            <a:endParaRPr lang="en-US" dirty="0"/>
+          </a:p>
+        </p:txBody>
+      </p:sp>
+      <p:sp>
+        <p:nvSpPr>
+          <p:cNvPr id="5" name="Slide Number Placeholder 4">
+            <a:extLst>
+              <a:ext uri="{FF2B5EF4-FFF2-40B4-BE49-F238E27FC236}">
+                <a16:creationId xmlns:a16="http://schemas.microsoft.com/office/drawing/2014/main" id="{A8B05B8E-A1A0-463D-AE08-72DF64561405}"/>
+              </a:ext>
+            </a:extLst>
+          </p:cNvPr>
+          <p:cNvSpPr>
+            <a:spLocks noGrp="1"/>
+          </p:cNvSpPr>
+          <p:nvPr>
+            <p:ph type="sldNum" sz="quarter" idx="12"/>
+          </p:nvPr>
+        </p:nvSpPr>
+        <p:spPr/>
+        <p:txBody>
+          <a:bodyPr/>
+          <a:lstStyle/>
+          <a:p>
+            <a:fld id="{AED3D424-D5FA-4721-A71E-77CBBB5C48D0}" type="slidenum">
+              <a:rPr lang="en-US" smtClean="0"/>
+              <a:t>10</a:t>
+            </a:fld>
+            <a:endParaRPr lang="en-US" dirty="0"/>
+          </a:p>
+        </p:txBody>
+      </p:sp>
     </p:spTree>
     <p:extLst>
       <p:ext uri="{BB962C8B-B14F-4D97-AF65-F5344CB8AC3E}">
@@ -4652,6 +5169,64 @@
           </a:p>
         </p:txBody>
       </p:sp>
+      <p:sp>
+        <p:nvSpPr>
+          <p:cNvPr id="4" name="Footer Placeholder 3">
+            <a:extLst>
+              <a:ext uri="{FF2B5EF4-FFF2-40B4-BE49-F238E27FC236}">
+                <a16:creationId xmlns:a16="http://schemas.microsoft.com/office/drawing/2014/main" id="{89932471-B2E9-4D68-9E1C-2692FC26A58E}"/>
+              </a:ext>
+            </a:extLst>
+          </p:cNvPr>
+          <p:cNvSpPr>
+            <a:spLocks noGrp="1"/>
+          </p:cNvSpPr>
+          <p:nvPr>
+            <p:ph type="ftr" sz="quarter" idx="11"/>
+          </p:nvPr>
+        </p:nvSpPr>
+        <p:spPr/>
+        <p:txBody>
+          <a:bodyPr/>
+          <a:lstStyle/>
+          <a:p>
+            <a:r>
+              <a:rPr lang="en-US"/>
+              <a:t>https://github.com/avifarah/Recurson</a:t>
+            </a:r>
+            <a:endParaRPr lang="en-US" dirty="0"/>
+          </a:p>
+        </p:txBody>
+      </p:sp>
+      <p:sp>
+        <p:nvSpPr>
+          <p:cNvPr id="5" name="Slide Number Placeholder 4">
+            <a:extLst>
+              <a:ext uri="{FF2B5EF4-FFF2-40B4-BE49-F238E27FC236}">
+                <a16:creationId xmlns:a16="http://schemas.microsoft.com/office/drawing/2014/main" id="{E60E47C2-C986-4757-889F-2FBE7AB3906F}"/>
+              </a:ext>
+            </a:extLst>
+          </p:cNvPr>
+          <p:cNvSpPr>
+            <a:spLocks noGrp="1"/>
+          </p:cNvSpPr>
+          <p:nvPr>
+            <p:ph type="sldNum" sz="quarter" idx="12"/>
+          </p:nvPr>
+        </p:nvSpPr>
+        <p:spPr/>
+        <p:txBody>
+          <a:bodyPr/>
+          <a:lstStyle/>
+          <a:p>
+            <a:fld id="{AED3D424-D5FA-4721-A71E-77CBBB5C48D0}" type="slidenum">
+              <a:rPr lang="en-US" smtClean="0"/>
+              <a:t>2</a:t>
+            </a:fld>
+            <a:endParaRPr lang="en-US" dirty="0"/>
+          </a:p>
+        </p:txBody>
+      </p:sp>
     </p:spTree>
     <p:extLst>
       <p:ext uri="{BB962C8B-B14F-4D97-AF65-F5344CB8AC3E}">
@@ -4662,6 +5237,636 @@
   <p:clrMapOvr>
     <a:masterClrMapping/>
   </p:clrMapOvr>
+  <p:timing>
+    <p:tnLst>
+      <p:par>
+        <p:cTn id="1" dur="indefinite" restart="never" nodeType="tmRoot">
+          <p:childTnLst>
+            <p:seq concurrent="1" nextAc="seek">
+              <p:cTn id="2" dur="indefinite" nodeType="mainSeq">
+                <p:childTnLst>
+                  <p:par>
+                    <p:cTn id="3" fill="hold">
+                      <p:stCondLst>
+                        <p:cond delay="indefinite"/>
+                      </p:stCondLst>
+                      <p:childTnLst>
+                        <p:par>
+                          <p:cTn id="4" fill="hold">
+                            <p:stCondLst>
+                              <p:cond delay="0"/>
+                            </p:stCondLst>
+                            <p:childTnLst>
+                              <p:par>
+                                <p:cTn id="5" presetID="42" presetClass="entr" presetSubtype="0" fill="hold" nodeType="clickEffect">
+                                  <p:stCondLst>
+                                    <p:cond delay="0"/>
+                                  </p:stCondLst>
+                                  <p:childTnLst>
+                                    <p:set>
+                                      <p:cBhvr>
+                                        <p:cTn id="6" dur="1" fill="hold">
+                                          <p:stCondLst>
+                                            <p:cond delay="0"/>
+                                          </p:stCondLst>
+                                        </p:cTn>
+                                        <p:tgtEl>
+                                          <p:spTgt spid="3">
+                                            <p:txEl>
+                                              <p:pRg st="5" end="5"/>
+                                            </p:txEl>
+                                          </p:spTgt>
+                                        </p:tgtEl>
+                                        <p:attrNameLst>
+                                          <p:attrName>style.visibility</p:attrName>
+                                        </p:attrNameLst>
+                                      </p:cBhvr>
+                                      <p:to>
+                                        <p:strVal val="visible"/>
+                                      </p:to>
+                                    </p:set>
+                                    <p:animEffect transition="in" filter="fade">
+                                      <p:cBhvr>
+                                        <p:cTn id="7" dur="1000"/>
+                                        <p:tgtEl>
+                                          <p:spTgt spid="3">
+                                            <p:txEl>
+                                              <p:pRg st="5" end="5"/>
+                                            </p:txEl>
+                                          </p:spTgt>
+                                        </p:tgtEl>
+                                      </p:cBhvr>
+                                    </p:animEffect>
+                                    <p:anim calcmode="lin" valueType="num">
+                                      <p:cBhvr>
+                                        <p:cTn id="8" dur="1000" fill="hold"/>
+                                        <p:tgtEl>
+                                          <p:spTgt spid="3">
+                                            <p:txEl>
+                                              <p:pRg st="5" end="5"/>
+                                            </p:txEl>
+                                          </p:spTgt>
+                                        </p:tgtEl>
+                                        <p:attrNameLst>
+                                          <p:attrName>ppt_x</p:attrName>
+                                        </p:attrNameLst>
+                                      </p:cBhvr>
+                                      <p:tavLst>
+                                        <p:tav tm="0">
+                                          <p:val>
+                                            <p:strVal val="#ppt_x"/>
+                                          </p:val>
+                                        </p:tav>
+                                        <p:tav tm="100000">
+                                          <p:val>
+                                            <p:strVal val="#ppt_x"/>
+                                          </p:val>
+                                        </p:tav>
+                                      </p:tavLst>
+                                    </p:anim>
+                                    <p:anim calcmode="lin" valueType="num">
+                                      <p:cBhvr>
+                                        <p:cTn id="9" dur="1000" fill="hold"/>
+                                        <p:tgtEl>
+                                          <p:spTgt spid="3">
+                                            <p:txEl>
+                                              <p:pRg st="5" end="5"/>
+                                            </p:txEl>
+                                          </p:spTgt>
+                                        </p:tgtEl>
+                                        <p:attrNameLst>
+                                          <p:attrName>ppt_y</p:attrName>
+                                        </p:attrNameLst>
+                                      </p:cBhvr>
+                                      <p:tavLst>
+                                        <p:tav tm="0">
+                                          <p:val>
+                                            <p:strVal val="#ppt_y+.1"/>
+                                          </p:val>
+                                        </p:tav>
+                                        <p:tav tm="100000">
+                                          <p:val>
+                                            <p:strVal val="#ppt_y"/>
+                                          </p:val>
+                                        </p:tav>
+                                      </p:tavLst>
+                                    </p:anim>
+                                  </p:childTnLst>
+                                </p:cTn>
+                              </p:par>
+                              <p:par>
+                                <p:cTn id="10" presetID="42" presetClass="entr" presetSubtype="0" fill="hold" nodeType="withEffect">
+                                  <p:stCondLst>
+                                    <p:cond delay="0"/>
+                                  </p:stCondLst>
+                                  <p:childTnLst>
+                                    <p:set>
+                                      <p:cBhvr>
+                                        <p:cTn id="11" dur="1" fill="hold">
+                                          <p:stCondLst>
+                                            <p:cond delay="0"/>
+                                          </p:stCondLst>
+                                        </p:cTn>
+                                        <p:tgtEl>
+                                          <p:spTgt spid="3">
+                                            <p:txEl>
+                                              <p:pRg st="6" end="6"/>
+                                            </p:txEl>
+                                          </p:spTgt>
+                                        </p:tgtEl>
+                                        <p:attrNameLst>
+                                          <p:attrName>style.visibility</p:attrName>
+                                        </p:attrNameLst>
+                                      </p:cBhvr>
+                                      <p:to>
+                                        <p:strVal val="visible"/>
+                                      </p:to>
+                                    </p:set>
+                                    <p:animEffect transition="in" filter="fade">
+                                      <p:cBhvr>
+                                        <p:cTn id="12" dur="1000"/>
+                                        <p:tgtEl>
+                                          <p:spTgt spid="3">
+                                            <p:txEl>
+                                              <p:pRg st="6" end="6"/>
+                                            </p:txEl>
+                                          </p:spTgt>
+                                        </p:tgtEl>
+                                      </p:cBhvr>
+                                    </p:animEffect>
+                                    <p:anim calcmode="lin" valueType="num">
+                                      <p:cBhvr>
+                                        <p:cTn id="13" dur="1000" fill="hold"/>
+                                        <p:tgtEl>
+                                          <p:spTgt spid="3">
+                                            <p:txEl>
+                                              <p:pRg st="6" end="6"/>
+                                            </p:txEl>
+                                          </p:spTgt>
+                                        </p:tgtEl>
+                                        <p:attrNameLst>
+                                          <p:attrName>ppt_x</p:attrName>
+                                        </p:attrNameLst>
+                                      </p:cBhvr>
+                                      <p:tavLst>
+                                        <p:tav tm="0">
+                                          <p:val>
+                                            <p:strVal val="#ppt_x"/>
+                                          </p:val>
+                                        </p:tav>
+                                        <p:tav tm="100000">
+                                          <p:val>
+                                            <p:strVal val="#ppt_x"/>
+                                          </p:val>
+                                        </p:tav>
+                                      </p:tavLst>
+                                    </p:anim>
+                                    <p:anim calcmode="lin" valueType="num">
+                                      <p:cBhvr>
+                                        <p:cTn id="14" dur="1000" fill="hold"/>
+                                        <p:tgtEl>
+                                          <p:spTgt spid="3">
+                                            <p:txEl>
+                                              <p:pRg st="6" end="6"/>
+                                            </p:txEl>
+                                          </p:spTgt>
+                                        </p:tgtEl>
+                                        <p:attrNameLst>
+                                          <p:attrName>ppt_y</p:attrName>
+                                        </p:attrNameLst>
+                                      </p:cBhvr>
+                                      <p:tavLst>
+                                        <p:tav tm="0">
+                                          <p:val>
+                                            <p:strVal val="#ppt_y+.1"/>
+                                          </p:val>
+                                        </p:tav>
+                                        <p:tav tm="100000">
+                                          <p:val>
+                                            <p:strVal val="#ppt_y"/>
+                                          </p:val>
+                                        </p:tav>
+                                      </p:tavLst>
+                                    </p:anim>
+                                  </p:childTnLst>
+                                </p:cTn>
+                              </p:par>
+                              <p:par>
+                                <p:cTn id="15" presetID="42" presetClass="entr" presetSubtype="0" fill="hold" nodeType="withEffect">
+                                  <p:stCondLst>
+                                    <p:cond delay="0"/>
+                                  </p:stCondLst>
+                                  <p:childTnLst>
+                                    <p:set>
+                                      <p:cBhvr>
+                                        <p:cTn id="16" dur="1" fill="hold">
+                                          <p:stCondLst>
+                                            <p:cond delay="0"/>
+                                          </p:stCondLst>
+                                        </p:cTn>
+                                        <p:tgtEl>
+                                          <p:spTgt spid="3">
+                                            <p:txEl>
+                                              <p:pRg st="7" end="7"/>
+                                            </p:txEl>
+                                          </p:spTgt>
+                                        </p:tgtEl>
+                                        <p:attrNameLst>
+                                          <p:attrName>style.visibility</p:attrName>
+                                        </p:attrNameLst>
+                                      </p:cBhvr>
+                                      <p:to>
+                                        <p:strVal val="visible"/>
+                                      </p:to>
+                                    </p:set>
+                                    <p:animEffect transition="in" filter="fade">
+                                      <p:cBhvr>
+                                        <p:cTn id="17" dur="1000"/>
+                                        <p:tgtEl>
+                                          <p:spTgt spid="3">
+                                            <p:txEl>
+                                              <p:pRg st="7" end="7"/>
+                                            </p:txEl>
+                                          </p:spTgt>
+                                        </p:tgtEl>
+                                      </p:cBhvr>
+                                    </p:animEffect>
+                                    <p:anim calcmode="lin" valueType="num">
+                                      <p:cBhvr>
+                                        <p:cTn id="18" dur="1000" fill="hold"/>
+                                        <p:tgtEl>
+                                          <p:spTgt spid="3">
+                                            <p:txEl>
+                                              <p:pRg st="7" end="7"/>
+                                            </p:txEl>
+                                          </p:spTgt>
+                                        </p:tgtEl>
+                                        <p:attrNameLst>
+                                          <p:attrName>ppt_x</p:attrName>
+                                        </p:attrNameLst>
+                                      </p:cBhvr>
+                                      <p:tavLst>
+                                        <p:tav tm="0">
+                                          <p:val>
+                                            <p:strVal val="#ppt_x"/>
+                                          </p:val>
+                                        </p:tav>
+                                        <p:tav tm="100000">
+                                          <p:val>
+                                            <p:strVal val="#ppt_x"/>
+                                          </p:val>
+                                        </p:tav>
+                                      </p:tavLst>
+                                    </p:anim>
+                                    <p:anim calcmode="lin" valueType="num">
+                                      <p:cBhvr>
+                                        <p:cTn id="19" dur="1000" fill="hold"/>
+                                        <p:tgtEl>
+                                          <p:spTgt spid="3">
+                                            <p:txEl>
+                                              <p:pRg st="7" end="7"/>
+                                            </p:txEl>
+                                          </p:spTgt>
+                                        </p:tgtEl>
+                                        <p:attrNameLst>
+                                          <p:attrName>ppt_y</p:attrName>
+                                        </p:attrNameLst>
+                                      </p:cBhvr>
+                                      <p:tavLst>
+                                        <p:tav tm="0">
+                                          <p:val>
+                                            <p:strVal val="#ppt_y+.1"/>
+                                          </p:val>
+                                        </p:tav>
+                                        <p:tav tm="100000">
+                                          <p:val>
+                                            <p:strVal val="#ppt_y"/>
+                                          </p:val>
+                                        </p:tav>
+                                      </p:tavLst>
+                                    </p:anim>
+                                  </p:childTnLst>
+                                </p:cTn>
+                              </p:par>
+                              <p:par>
+                                <p:cTn id="20" presetID="42" presetClass="entr" presetSubtype="0" fill="hold" nodeType="withEffect">
+                                  <p:stCondLst>
+                                    <p:cond delay="0"/>
+                                  </p:stCondLst>
+                                  <p:childTnLst>
+                                    <p:set>
+                                      <p:cBhvr>
+                                        <p:cTn id="21" dur="1" fill="hold">
+                                          <p:stCondLst>
+                                            <p:cond delay="0"/>
+                                          </p:stCondLst>
+                                        </p:cTn>
+                                        <p:tgtEl>
+                                          <p:spTgt spid="3">
+                                            <p:txEl>
+                                              <p:pRg st="8" end="8"/>
+                                            </p:txEl>
+                                          </p:spTgt>
+                                        </p:tgtEl>
+                                        <p:attrNameLst>
+                                          <p:attrName>style.visibility</p:attrName>
+                                        </p:attrNameLst>
+                                      </p:cBhvr>
+                                      <p:to>
+                                        <p:strVal val="visible"/>
+                                      </p:to>
+                                    </p:set>
+                                    <p:animEffect transition="in" filter="fade">
+                                      <p:cBhvr>
+                                        <p:cTn id="22" dur="1000"/>
+                                        <p:tgtEl>
+                                          <p:spTgt spid="3">
+                                            <p:txEl>
+                                              <p:pRg st="8" end="8"/>
+                                            </p:txEl>
+                                          </p:spTgt>
+                                        </p:tgtEl>
+                                      </p:cBhvr>
+                                    </p:animEffect>
+                                    <p:anim calcmode="lin" valueType="num">
+                                      <p:cBhvr>
+                                        <p:cTn id="23" dur="1000" fill="hold"/>
+                                        <p:tgtEl>
+                                          <p:spTgt spid="3">
+                                            <p:txEl>
+                                              <p:pRg st="8" end="8"/>
+                                            </p:txEl>
+                                          </p:spTgt>
+                                        </p:tgtEl>
+                                        <p:attrNameLst>
+                                          <p:attrName>ppt_x</p:attrName>
+                                        </p:attrNameLst>
+                                      </p:cBhvr>
+                                      <p:tavLst>
+                                        <p:tav tm="0">
+                                          <p:val>
+                                            <p:strVal val="#ppt_x"/>
+                                          </p:val>
+                                        </p:tav>
+                                        <p:tav tm="100000">
+                                          <p:val>
+                                            <p:strVal val="#ppt_x"/>
+                                          </p:val>
+                                        </p:tav>
+                                      </p:tavLst>
+                                    </p:anim>
+                                    <p:anim calcmode="lin" valueType="num">
+                                      <p:cBhvr>
+                                        <p:cTn id="24" dur="1000" fill="hold"/>
+                                        <p:tgtEl>
+                                          <p:spTgt spid="3">
+                                            <p:txEl>
+                                              <p:pRg st="8" end="8"/>
+                                            </p:txEl>
+                                          </p:spTgt>
+                                        </p:tgtEl>
+                                        <p:attrNameLst>
+                                          <p:attrName>ppt_y</p:attrName>
+                                        </p:attrNameLst>
+                                      </p:cBhvr>
+                                      <p:tavLst>
+                                        <p:tav tm="0">
+                                          <p:val>
+                                            <p:strVal val="#ppt_y+.1"/>
+                                          </p:val>
+                                        </p:tav>
+                                        <p:tav tm="100000">
+                                          <p:val>
+                                            <p:strVal val="#ppt_y"/>
+                                          </p:val>
+                                        </p:tav>
+                                      </p:tavLst>
+                                    </p:anim>
+                                  </p:childTnLst>
+                                </p:cTn>
+                              </p:par>
+                              <p:par>
+                                <p:cTn id="25" presetID="42" presetClass="entr" presetSubtype="0" fill="hold" nodeType="withEffect">
+                                  <p:stCondLst>
+                                    <p:cond delay="0"/>
+                                  </p:stCondLst>
+                                  <p:childTnLst>
+                                    <p:set>
+                                      <p:cBhvr>
+                                        <p:cTn id="26" dur="1" fill="hold">
+                                          <p:stCondLst>
+                                            <p:cond delay="0"/>
+                                          </p:stCondLst>
+                                        </p:cTn>
+                                        <p:tgtEl>
+                                          <p:spTgt spid="3">
+                                            <p:txEl>
+                                              <p:pRg st="9" end="9"/>
+                                            </p:txEl>
+                                          </p:spTgt>
+                                        </p:tgtEl>
+                                        <p:attrNameLst>
+                                          <p:attrName>style.visibility</p:attrName>
+                                        </p:attrNameLst>
+                                      </p:cBhvr>
+                                      <p:to>
+                                        <p:strVal val="visible"/>
+                                      </p:to>
+                                    </p:set>
+                                    <p:animEffect transition="in" filter="fade">
+                                      <p:cBhvr>
+                                        <p:cTn id="27" dur="1000"/>
+                                        <p:tgtEl>
+                                          <p:spTgt spid="3">
+                                            <p:txEl>
+                                              <p:pRg st="9" end="9"/>
+                                            </p:txEl>
+                                          </p:spTgt>
+                                        </p:tgtEl>
+                                      </p:cBhvr>
+                                    </p:animEffect>
+                                    <p:anim calcmode="lin" valueType="num">
+                                      <p:cBhvr>
+                                        <p:cTn id="28" dur="1000" fill="hold"/>
+                                        <p:tgtEl>
+                                          <p:spTgt spid="3">
+                                            <p:txEl>
+                                              <p:pRg st="9" end="9"/>
+                                            </p:txEl>
+                                          </p:spTgt>
+                                        </p:tgtEl>
+                                        <p:attrNameLst>
+                                          <p:attrName>ppt_x</p:attrName>
+                                        </p:attrNameLst>
+                                      </p:cBhvr>
+                                      <p:tavLst>
+                                        <p:tav tm="0">
+                                          <p:val>
+                                            <p:strVal val="#ppt_x"/>
+                                          </p:val>
+                                        </p:tav>
+                                        <p:tav tm="100000">
+                                          <p:val>
+                                            <p:strVal val="#ppt_x"/>
+                                          </p:val>
+                                        </p:tav>
+                                      </p:tavLst>
+                                    </p:anim>
+                                    <p:anim calcmode="lin" valueType="num">
+                                      <p:cBhvr>
+                                        <p:cTn id="29" dur="1000" fill="hold"/>
+                                        <p:tgtEl>
+                                          <p:spTgt spid="3">
+                                            <p:txEl>
+                                              <p:pRg st="9" end="9"/>
+                                            </p:txEl>
+                                          </p:spTgt>
+                                        </p:tgtEl>
+                                        <p:attrNameLst>
+                                          <p:attrName>ppt_y</p:attrName>
+                                        </p:attrNameLst>
+                                      </p:cBhvr>
+                                      <p:tavLst>
+                                        <p:tav tm="0">
+                                          <p:val>
+                                            <p:strVal val="#ppt_y+.1"/>
+                                          </p:val>
+                                        </p:tav>
+                                        <p:tav tm="100000">
+                                          <p:val>
+                                            <p:strVal val="#ppt_y"/>
+                                          </p:val>
+                                        </p:tav>
+                                      </p:tavLst>
+                                    </p:anim>
+                                  </p:childTnLst>
+                                </p:cTn>
+                              </p:par>
+                              <p:par>
+                                <p:cTn id="30" presetID="42" presetClass="entr" presetSubtype="0" fill="hold" nodeType="withEffect">
+                                  <p:stCondLst>
+                                    <p:cond delay="0"/>
+                                  </p:stCondLst>
+                                  <p:childTnLst>
+                                    <p:set>
+                                      <p:cBhvr>
+                                        <p:cTn id="31" dur="1" fill="hold">
+                                          <p:stCondLst>
+                                            <p:cond delay="0"/>
+                                          </p:stCondLst>
+                                        </p:cTn>
+                                        <p:tgtEl>
+                                          <p:spTgt spid="3">
+                                            <p:txEl>
+                                              <p:pRg st="10" end="10"/>
+                                            </p:txEl>
+                                          </p:spTgt>
+                                        </p:tgtEl>
+                                        <p:attrNameLst>
+                                          <p:attrName>style.visibility</p:attrName>
+                                        </p:attrNameLst>
+                                      </p:cBhvr>
+                                      <p:to>
+                                        <p:strVal val="visible"/>
+                                      </p:to>
+                                    </p:set>
+                                    <p:animEffect transition="in" filter="fade">
+                                      <p:cBhvr>
+                                        <p:cTn id="32" dur="1000"/>
+                                        <p:tgtEl>
+                                          <p:spTgt spid="3">
+                                            <p:txEl>
+                                              <p:pRg st="10" end="10"/>
+                                            </p:txEl>
+                                          </p:spTgt>
+                                        </p:tgtEl>
+                                      </p:cBhvr>
+                                    </p:animEffect>
+                                    <p:anim calcmode="lin" valueType="num">
+                                      <p:cBhvr>
+                                        <p:cTn id="33" dur="1000" fill="hold"/>
+                                        <p:tgtEl>
+                                          <p:spTgt spid="3">
+                                            <p:txEl>
+                                              <p:pRg st="10" end="10"/>
+                                            </p:txEl>
+                                          </p:spTgt>
+                                        </p:tgtEl>
+                                        <p:attrNameLst>
+                                          <p:attrName>ppt_x</p:attrName>
+                                        </p:attrNameLst>
+                                      </p:cBhvr>
+                                      <p:tavLst>
+                                        <p:tav tm="0">
+                                          <p:val>
+                                            <p:strVal val="#ppt_x"/>
+                                          </p:val>
+                                        </p:tav>
+                                        <p:tav tm="100000">
+                                          <p:val>
+                                            <p:strVal val="#ppt_x"/>
+                                          </p:val>
+                                        </p:tav>
+                                      </p:tavLst>
+                                    </p:anim>
+                                    <p:anim calcmode="lin" valueType="num">
+                                      <p:cBhvr>
+                                        <p:cTn id="34" dur="1000" fill="hold"/>
+                                        <p:tgtEl>
+                                          <p:spTgt spid="3">
+                                            <p:txEl>
+                                              <p:pRg st="10" end="10"/>
+                                            </p:txEl>
+                                          </p:spTgt>
+                                        </p:tgtEl>
+                                        <p:attrNameLst>
+                                          <p:attrName>ppt_y</p:attrName>
+                                        </p:attrNameLst>
+                                      </p:cBhvr>
+                                      <p:tavLst>
+                                        <p:tav tm="0">
+                                          <p:val>
+                                            <p:strVal val="#ppt_y+.1"/>
+                                          </p:val>
+                                        </p:tav>
+                                        <p:tav tm="100000">
+                                          <p:val>
+                                            <p:strVal val="#ppt_y"/>
+                                          </p:val>
+                                        </p:tav>
+                                      </p:tavLst>
+                                    </p:anim>
+                                  </p:childTnLst>
+                                </p:cTn>
+                              </p:par>
+                            </p:childTnLst>
+                          </p:cTn>
+                        </p:par>
+                      </p:childTnLst>
+                    </p:cTn>
+                  </p:par>
+                </p:childTnLst>
+              </p:cTn>
+              <p:prevCondLst>
+                <p:cond evt="onPrev" delay="0">
+                  <p:tgtEl>
+                    <p:sldTgt/>
+                  </p:tgtEl>
+                </p:cond>
+              </p:prevCondLst>
+              <p:nextCondLst>
+                <p:cond evt="onNext" delay="0">
+                  <p:tgtEl>
+                    <p:sldTgt/>
+                  </p:tgtEl>
+                </p:cond>
+              </p:nextCondLst>
+            </p:seq>
+          </p:childTnLst>
+        </p:cTn>
+      </p:par>
+    </p:tnLst>
+  </p:timing>
 </p:sld>
 </file>
 
@@ -5006,6 +6211,64 @@
           </a:p>
         </p:txBody>
       </p:sp>
+      <p:sp>
+        <p:nvSpPr>
+          <p:cNvPr id="4" name="Footer Placeholder 3">
+            <a:extLst>
+              <a:ext uri="{FF2B5EF4-FFF2-40B4-BE49-F238E27FC236}">
+                <a16:creationId xmlns:a16="http://schemas.microsoft.com/office/drawing/2014/main" id="{241F8BE5-3B7F-4357-90D0-F81CF1893943}"/>
+              </a:ext>
+            </a:extLst>
+          </p:cNvPr>
+          <p:cNvSpPr>
+            <a:spLocks noGrp="1"/>
+          </p:cNvSpPr>
+          <p:nvPr>
+            <p:ph type="ftr" sz="quarter" idx="11"/>
+          </p:nvPr>
+        </p:nvSpPr>
+        <p:spPr/>
+        <p:txBody>
+          <a:bodyPr/>
+          <a:lstStyle/>
+          <a:p>
+            <a:r>
+              <a:rPr lang="en-US"/>
+              <a:t>https://github.com/avifarah/Recurson</a:t>
+            </a:r>
+            <a:endParaRPr lang="en-US" dirty="0"/>
+          </a:p>
+        </p:txBody>
+      </p:sp>
+      <p:sp>
+        <p:nvSpPr>
+          <p:cNvPr id="5" name="Slide Number Placeholder 4">
+            <a:extLst>
+              <a:ext uri="{FF2B5EF4-FFF2-40B4-BE49-F238E27FC236}">
+                <a16:creationId xmlns:a16="http://schemas.microsoft.com/office/drawing/2014/main" id="{6DBD6EC6-2B20-43AE-BE74-0BFF291ED8BF}"/>
+              </a:ext>
+            </a:extLst>
+          </p:cNvPr>
+          <p:cNvSpPr>
+            <a:spLocks noGrp="1"/>
+          </p:cNvSpPr>
+          <p:nvPr>
+            <p:ph type="sldNum" sz="quarter" idx="12"/>
+          </p:nvPr>
+        </p:nvSpPr>
+        <p:spPr/>
+        <p:txBody>
+          <a:bodyPr/>
+          <a:lstStyle/>
+          <a:p>
+            <a:fld id="{AED3D424-D5FA-4721-A71E-77CBBB5C48D0}" type="slidenum">
+              <a:rPr lang="en-US" smtClean="0"/>
+              <a:t>3</a:t>
+            </a:fld>
+            <a:endParaRPr lang="en-US" dirty="0"/>
+          </a:p>
+        </p:txBody>
+      </p:sp>
     </p:spTree>
     <p:extLst>
       <p:ext uri="{BB962C8B-B14F-4D97-AF65-F5344CB8AC3E}">
@@ -5016,6 +6279,600 @@
   <p:clrMapOvr>
     <a:masterClrMapping/>
   </p:clrMapOvr>
+  <p:timing>
+    <p:tnLst>
+      <p:par>
+        <p:cTn id="1" dur="indefinite" restart="never" nodeType="tmRoot">
+          <p:childTnLst>
+            <p:seq concurrent="1" nextAc="seek">
+              <p:cTn id="2" dur="indefinite" nodeType="mainSeq">
+                <p:childTnLst>
+                  <p:par>
+                    <p:cTn id="3" fill="hold">
+                      <p:stCondLst>
+                        <p:cond delay="indefinite"/>
+                      </p:stCondLst>
+                      <p:childTnLst>
+                        <p:par>
+                          <p:cTn id="4" fill="hold">
+                            <p:stCondLst>
+                              <p:cond delay="0"/>
+                            </p:stCondLst>
+                            <p:childTnLst>
+                              <p:par>
+                                <p:cTn id="5" presetID="2" presetClass="entr" presetSubtype="4" fill="hold" nodeType="clickEffect">
+                                  <p:stCondLst>
+                                    <p:cond delay="0"/>
+                                  </p:stCondLst>
+                                  <p:childTnLst>
+                                    <p:set>
+                                      <p:cBhvr>
+                                        <p:cTn id="6" dur="1" fill="hold">
+                                          <p:stCondLst>
+                                            <p:cond delay="0"/>
+                                          </p:stCondLst>
+                                        </p:cTn>
+                                        <p:tgtEl>
+                                          <p:spTgt spid="3">
+                                            <p:txEl>
+                                              <p:pRg st="4" end="4"/>
+                                            </p:txEl>
+                                          </p:spTgt>
+                                        </p:tgtEl>
+                                        <p:attrNameLst>
+                                          <p:attrName>style.visibility</p:attrName>
+                                        </p:attrNameLst>
+                                      </p:cBhvr>
+                                      <p:to>
+                                        <p:strVal val="visible"/>
+                                      </p:to>
+                                    </p:set>
+                                    <p:anim calcmode="lin" valueType="num">
+                                      <p:cBhvr additive="base">
+                                        <p:cTn id="7" dur="500" fill="hold"/>
+                                        <p:tgtEl>
+                                          <p:spTgt spid="3">
+                                            <p:txEl>
+                                              <p:pRg st="4" end="4"/>
+                                            </p:txEl>
+                                          </p:spTgt>
+                                        </p:tgtEl>
+                                        <p:attrNameLst>
+                                          <p:attrName>ppt_x</p:attrName>
+                                        </p:attrNameLst>
+                                      </p:cBhvr>
+                                      <p:tavLst>
+                                        <p:tav tm="0">
+                                          <p:val>
+                                            <p:strVal val="#ppt_x"/>
+                                          </p:val>
+                                        </p:tav>
+                                        <p:tav tm="100000">
+                                          <p:val>
+                                            <p:strVal val="#ppt_x"/>
+                                          </p:val>
+                                        </p:tav>
+                                      </p:tavLst>
+                                    </p:anim>
+                                    <p:anim calcmode="lin" valueType="num">
+                                      <p:cBhvr additive="base">
+                                        <p:cTn id="8" dur="500" fill="hold"/>
+                                        <p:tgtEl>
+                                          <p:spTgt spid="3">
+                                            <p:txEl>
+                                              <p:pRg st="4" end="4"/>
+                                            </p:txEl>
+                                          </p:spTgt>
+                                        </p:tgtEl>
+                                        <p:attrNameLst>
+                                          <p:attrName>ppt_y</p:attrName>
+                                        </p:attrNameLst>
+                                      </p:cBhvr>
+                                      <p:tavLst>
+                                        <p:tav tm="0">
+                                          <p:val>
+                                            <p:strVal val="1+#ppt_h/2"/>
+                                          </p:val>
+                                        </p:tav>
+                                        <p:tav tm="100000">
+                                          <p:val>
+                                            <p:strVal val="#ppt_y"/>
+                                          </p:val>
+                                        </p:tav>
+                                      </p:tavLst>
+                                    </p:anim>
+                                  </p:childTnLst>
+                                </p:cTn>
+                              </p:par>
+                              <p:par>
+                                <p:cTn id="9" presetID="2" presetClass="entr" presetSubtype="4" fill="hold" nodeType="withEffect">
+                                  <p:stCondLst>
+                                    <p:cond delay="0"/>
+                                  </p:stCondLst>
+                                  <p:childTnLst>
+                                    <p:set>
+                                      <p:cBhvr>
+                                        <p:cTn id="10" dur="1" fill="hold">
+                                          <p:stCondLst>
+                                            <p:cond delay="0"/>
+                                          </p:stCondLst>
+                                        </p:cTn>
+                                        <p:tgtEl>
+                                          <p:spTgt spid="3">
+                                            <p:txEl>
+                                              <p:pRg st="5" end="5"/>
+                                            </p:txEl>
+                                          </p:spTgt>
+                                        </p:tgtEl>
+                                        <p:attrNameLst>
+                                          <p:attrName>style.visibility</p:attrName>
+                                        </p:attrNameLst>
+                                      </p:cBhvr>
+                                      <p:to>
+                                        <p:strVal val="visible"/>
+                                      </p:to>
+                                    </p:set>
+                                    <p:anim calcmode="lin" valueType="num">
+                                      <p:cBhvr additive="base">
+                                        <p:cTn id="11" dur="500" fill="hold"/>
+                                        <p:tgtEl>
+                                          <p:spTgt spid="3">
+                                            <p:txEl>
+                                              <p:pRg st="5" end="5"/>
+                                            </p:txEl>
+                                          </p:spTgt>
+                                        </p:tgtEl>
+                                        <p:attrNameLst>
+                                          <p:attrName>ppt_x</p:attrName>
+                                        </p:attrNameLst>
+                                      </p:cBhvr>
+                                      <p:tavLst>
+                                        <p:tav tm="0">
+                                          <p:val>
+                                            <p:strVal val="#ppt_x"/>
+                                          </p:val>
+                                        </p:tav>
+                                        <p:tav tm="100000">
+                                          <p:val>
+                                            <p:strVal val="#ppt_x"/>
+                                          </p:val>
+                                        </p:tav>
+                                      </p:tavLst>
+                                    </p:anim>
+                                    <p:anim calcmode="lin" valueType="num">
+                                      <p:cBhvr additive="base">
+                                        <p:cTn id="12" dur="500" fill="hold"/>
+                                        <p:tgtEl>
+                                          <p:spTgt spid="3">
+                                            <p:txEl>
+                                              <p:pRg st="5" end="5"/>
+                                            </p:txEl>
+                                          </p:spTgt>
+                                        </p:tgtEl>
+                                        <p:attrNameLst>
+                                          <p:attrName>ppt_y</p:attrName>
+                                        </p:attrNameLst>
+                                      </p:cBhvr>
+                                      <p:tavLst>
+                                        <p:tav tm="0">
+                                          <p:val>
+                                            <p:strVal val="1+#ppt_h/2"/>
+                                          </p:val>
+                                        </p:tav>
+                                        <p:tav tm="100000">
+                                          <p:val>
+                                            <p:strVal val="#ppt_y"/>
+                                          </p:val>
+                                        </p:tav>
+                                      </p:tavLst>
+                                    </p:anim>
+                                  </p:childTnLst>
+                                </p:cTn>
+                              </p:par>
+                              <p:par>
+                                <p:cTn id="13" presetID="2" presetClass="entr" presetSubtype="4" fill="hold" nodeType="withEffect">
+                                  <p:stCondLst>
+                                    <p:cond delay="0"/>
+                                  </p:stCondLst>
+                                  <p:childTnLst>
+                                    <p:set>
+                                      <p:cBhvr>
+                                        <p:cTn id="14" dur="1" fill="hold">
+                                          <p:stCondLst>
+                                            <p:cond delay="0"/>
+                                          </p:stCondLst>
+                                        </p:cTn>
+                                        <p:tgtEl>
+                                          <p:spTgt spid="3">
+                                            <p:txEl>
+                                              <p:pRg st="6" end="6"/>
+                                            </p:txEl>
+                                          </p:spTgt>
+                                        </p:tgtEl>
+                                        <p:attrNameLst>
+                                          <p:attrName>style.visibility</p:attrName>
+                                        </p:attrNameLst>
+                                      </p:cBhvr>
+                                      <p:to>
+                                        <p:strVal val="visible"/>
+                                      </p:to>
+                                    </p:set>
+                                    <p:anim calcmode="lin" valueType="num">
+                                      <p:cBhvr additive="base">
+                                        <p:cTn id="15" dur="500" fill="hold"/>
+                                        <p:tgtEl>
+                                          <p:spTgt spid="3">
+                                            <p:txEl>
+                                              <p:pRg st="6" end="6"/>
+                                            </p:txEl>
+                                          </p:spTgt>
+                                        </p:tgtEl>
+                                        <p:attrNameLst>
+                                          <p:attrName>ppt_x</p:attrName>
+                                        </p:attrNameLst>
+                                      </p:cBhvr>
+                                      <p:tavLst>
+                                        <p:tav tm="0">
+                                          <p:val>
+                                            <p:strVal val="#ppt_x"/>
+                                          </p:val>
+                                        </p:tav>
+                                        <p:tav tm="100000">
+                                          <p:val>
+                                            <p:strVal val="#ppt_x"/>
+                                          </p:val>
+                                        </p:tav>
+                                      </p:tavLst>
+                                    </p:anim>
+                                    <p:anim calcmode="lin" valueType="num">
+                                      <p:cBhvr additive="base">
+                                        <p:cTn id="16" dur="500" fill="hold"/>
+                                        <p:tgtEl>
+                                          <p:spTgt spid="3">
+                                            <p:txEl>
+                                              <p:pRg st="6" end="6"/>
+                                            </p:txEl>
+                                          </p:spTgt>
+                                        </p:tgtEl>
+                                        <p:attrNameLst>
+                                          <p:attrName>ppt_y</p:attrName>
+                                        </p:attrNameLst>
+                                      </p:cBhvr>
+                                      <p:tavLst>
+                                        <p:tav tm="0">
+                                          <p:val>
+                                            <p:strVal val="1+#ppt_h/2"/>
+                                          </p:val>
+                                        </p:tav>
+                                        <p:tav tm="100000">
+                                          <p:val>
+                                            <p:strVal val="#ppt_y"/>
+                                          </p:val>
+                                        </p:tav>
+                                      </p:tavLst>
+                                    </p:anim>
+                                  </p:childTnLst>
+                                </p:cTn>
+                              </p:par>
+                            </p:childTnLst>
+                          </p:cTn>
+                        </p:par>
+                      </p:childTnLst>
+                    </p:cTn>
+                  </p:par>
+                  <p:par>
+                    <p:cTn id="17" fill="hold">
+                      <p:stCondLst>
+                        <p:cond delay="indefinite"/>
+                      </p:stCondLst>
+                      <p:childTnLst>
+                        <p:par>
+                          <p:cTn id="18" fill="hold">
+                            <p:stCondLst>
+                              <p:cond delay="0"/>
+                            </p:stCondLst>
+                            <p:childTnLst>
+                              <p:par>
+                                <p:cTn id="19" presetID="2" presetClass="entr" presetSubtype="4" fill="hold" nodeType="clickEffect">
+                                  <p:stCondLst>
+                                    <p:cond delay="0"/>
+                                  </p:stCondLst>
+                                  <p:childTnLst>
+                                    <p:set>
+                                      <p:cBhvr>
+                                        <p:cTn id="20" dur="1" fill="hold">
+                                          <p:stCondLst>
+                                            <p:cond delay="0"/>
+                                          </p:stCondLst>
+                                        </p:cTn>
+                                        <p:tgtEl>
+                                          <p:spTgt spid="3">
+                                            <p:txEl>
+                                              <p:pRg st="7" end="7"/>
+                                            </p:txEl>
+                                          </p:spTgt>
+                                        </p:tgtEl>
+                                        <p:attrNameLst>
+                                          <p:attrName>style.visibility</p:attrName>
+                                        </p:attrNameLst>
+                                      </p:cBhvr>
+                                      <p:to>
+                                        <p:strVal val="visible"/>
+                                      </p:to>
+                                    </p:set>
+                                    <p:anim calcmode="lin" valueType="num">
+                                      <p:cBhvr additive="base">
+                                        <p:cTn id="21" dur="500" fill="hold"/>
+                                        <p:tgtEl>
+                                          <p:spTgt spid="3">
+                                            <p:txEl>
+                                              <p:pRg st="7" end="7"/>
+                                            </p:txEl>
+                                          </p:spTgt>
+                                        </p:tgtEl>
+                                        <p:attrNameLst>
+                                          <p:attrName>ppt_x</p:attrName>
+                                        </p:attrNameLst>
+                                      </p:cBhvr>
+                                      <p:tavLst>
+                                        <p:tav tm="0">
+                                          <p:val>
+                                            <p:strVal val="#ppt_x"/>
+                                          </p:val>
+                                        </p:tav>
+                                        <p:tav tm="100000">
+                                          <p:val>
+                                            <p:strVal val="#ppt_x"/>
+                                          </p:val>
+                                        </p:tav>
+                                      </p:tavLst>
+                                    </p:anim>
+                                    <p:anim calcmode="lin" valueType="num">
+                                      <p:cBhvr additive="base">
+                                        <p:cTn id="22" dur="500" fill="hold"/>
+                                        <p:tgtEl>
+                                          <p:spTgt spid="3">
+                                            <p:txEl>
+                                              <p:pRg st="7" end="7"/>
+                                            </p:txEl>
+                                          </p:spTgt>
+                                        </p:tgtEl>
+                                        <p:attrNameLst>
+                                          <p:attrName>ppt_y</p:attrName>
+                                        </p:attrNameLst>
+                                      </p:cBhvr>
+                                      <p:tavLst>
+                                        <p:tav tm="0">
+                                          <p:val>
+                                            <p:strVal val="1+#ppt_h/2"/>
+                                          </p:val>
+                                        </p:tav>
+                                        <p:tav tm="100000">
+                                          <p:val>
+                                            <p:strVal val="#ppt_y"/>
+                                          </p:val>
+                                        </p:tav>
+                                      </p:tavLst>
+                                    </p:anim>
+                                  </p:childTnLst>
+                                </p:cTn>
+                              </p:par>
+                              <p:par>
+                                <p:cTn id="23" presetID="2" presetClass="entr" presetSubtype="4" fill="hold" nodeType="withEffect">
+                                  <p:stCondLst>
+                                    <p:cond delay="0"/>
+                                  </p:stCondLst>
+                                  <p:childTnLst>
+                                    <p:set>
+                                      <p:cBhvr>
+                                        <p:cTn id="24" dur="1" fill="hold">
+                                          <p:stCondLst>
+                                            <p:cond delay="0"/>
+                                          </p:stCondLst>
+                                        </p:cTn>
+                                        <p:tgtEl>
+                                          <p:spTgt spid="3">
+                                            <p:txEl>
+                                              <p:pRg st="8" end="8"/>
+                                            </p:txEl>
+                                          </p:spTgt>
+                                        </p:tgtEl>
+                                        <p:attrNameLst>
+                                          <p:attrName>style.visibility</p:attrName>
+                                        </p:attrNameLst>
+                                      </p:cBhvr>
+                                      <p:to>
+                                        <p:strVal val="visible"/>
+                                      </p:to>
+                                    </p:set>
+                                    <p:anim calcmode="lin" valueType="num">
+                                      <p:cBhvr additive="base">
+                                        <p:cTn id="25" dur="500" fill="hold"/>
+                                        <p:tgtEl>
+                                          <p:spTgt spid="3">
+                                            <p:txEl>
+                                              <p:pRg st="8" end="8"/>
+                                            </p:txEl>
+                                          </p:spTgt>
+                                        </p:tgtEl>
+                                        <p:attrNameLst>
+                                          <p:attrName>ppt_x</p:attrName>
+                                        </p:attrNameLst>
+                                      </p:cBhvr>
+                                      <p:tavLst>
+                                        <p:tav tm="0">
+                                          <p:val>
+                                            <p:strVal val="#ppt_x"/>
+                                          </p:val>
+                                        </p:tav>
+                                        <p:tav tm="100000">
+                                          <p:val>
+                                            <p:strVal val="#ppt_x"/>
+                                          </p:val>
+                                        </p:tav>
+                                      </p:tavLst>
+                                    </p:anim>
+                                    <p:anim calcmode="lin" valueType="num">
+                                      <p:cBhvr additive="base">
+                                        <p:cTn id="26" dur="500" fill="hold"/>
+                                        <p:tgtEl>
+                                          <p:spTgt spid="3">
+                                            <p:txEl>
+                                              <p:pRg st="8" end="8"/>
+                                            </p:txEl>
+                                          </p:spTgt>
+                                        </p:tgtEl>
+                                        <p:attrNameLst>
+                                          <p:attrName>ppt_y</p:attrName>
+                                        </p:attrNameLst>
+                                      </p:cBhvr>
+                                      <p:tavLst>
+                                        <p:tav tm="0">
+                                          <p:val>
+                                            <p:strVal val="1+#ppt_h/2"/>
+                                          </p:val>
+                                        </p:tav>
+                                        <p:tav tm="100000">
+                                          <p:val>
+                                            <p:strVal val="#ppt_y"/>
+                                          </p:val>
+                                        </p:tav>
+                                      </p:tavLst>
+                                    </p:anim>
+                                  </p:childTnLst>
+                                </p:cTn>
+                              </p:par>
+                            </p:childTnLst>
+                          </p:cTn>
+                        </p:par>
+                      </p:childTnLst>
+                    </p:cTn>
+                  </p:par>
+                  <p:par>
+                    <p:cTn id="27" fill="hold">
+                      <p:stCondLst>
+                        <p:cond delay="indefinite"/>
+                      </p:stCondLst>
+                      <p:childTnLst>
+                        <p:par>
+                          <p:cTn id="28" fill="hold">
+                            <p:stCondLst>
+                              <p:cond delay="0"/>
+                            </p:stCondLst>
+                            <p:childTnLst>
+                              <p:par>
+                                <p:cTn id="29" presetID="2" presetClass="entr" presetSubtype="4" fill="hold" nodeType="clickEffect">
+                                  <p:stCondLst>
+                                    <p:cond delay="0"/>
+                                  </p:stCondLst>
+                                  <p:childTnLst>
+                                    <p:set>
+                                      <p:cBhvr>
+                                        <p:cTn id="30" dur="1" fill="hold">
+                                          <p:stCondLst>
+                                            <p:cond delay="0"/>
+                                          </p:stCondLst>
+                                        </p:cTn>
+                                        <p:tgtEl>
+                                          <p:spTgt spid="3">
+                                            <p:txEl>
+                                              <p:pRg st="10" end="10"/>
+                                            </p:txEl>
+                                          </p:spTgt>
+                                        </p:tgtEl>
+                                        <p:attrNameLst>
+                                          <p:attrName>style.visibility</p:attrName>
+                                        </p:attrNameLst>
+                                      </p:cBhvr>
+                                      <p:to>
+                                        <p:strVal val="visible"/>
+                                      </p:to>
+                                    </p:set>
+                                    <p:anim calcmode="lin" valueType="num">
+                                      <p:cBhvr additive="base">
+                                        <p:cTn id="31" dur="500" fill="hold"/>
+                                        <p:tgtEl>
+                                          <p:spTgt spid="3">
+                                            <p:txEl>
+                                              <p:pRg st="10" end="10"/>
+                                            </p:txEl>
+                                          </p:spTgt>
+                                        </p:tgtEl>
+                                        <p:attrNameLst>
+                                          <p:attrName>ppt_x</p:attrName>
+                                        </p:attrNameLst>
+                                      </p:cBhvr>
+                                      <p:tavLst>
+                                        <p:tav tm="0">
+                                          <p:val>
+                                            <p:strVal val="#ppt_x"/>
+                                          </p:val>
+                                        </p:tav>
+                                        <p:tav tm="100000">
+                                          <p:val>
+                                            <p:strVal val="#ppt_x"/>
+                                          </p:val>
+                                        </p:tav>
+                                      </p:tavLst>
+                                    </p:anim>
+                                    <p:anim calcmode="lin" valueType="num">
+                                      <p:cBhvr additive="base">
+                                        <p:cTn id="32" dur="500" fill="hold"/>
+                                        <p:tgtEl>
+                                          <p:spTgt spid="3">
+                                            <p:txEl>
+                                              <p:pRg st="10" end="10"/>
+                                            </p:txEl>
+                                          </p:spTgt>
+                                        </p:tgtEl>
+                                        <p:attrNameLst>
+                                          <p:attrName>ppt_y</p:attrName>
+                                        </p:attrNameLst>
+                                      </p:cBhvr>
+                                      <p:tavLst>
+                                        <p:tav tm="0">
+                                          <p:val>
+                                            <p:strVal val="1+#ppt_h/2"/>
+                                          </p:val>
+                                        </p:tav>
+                                        <p:tav tm="100000">
+                                          <p:val>
+                                            <p:strVal val="#ppt_y"/>
+                                          </p:val>
+                                        </p:tav>
+                                      </p:tavLst>
+                                    </p:anim>
+                                  </p:childTnLst>
+                                </p:cTn>
+                              </p:par>
+                            </p:childTnLst>
+                          </p:cTn>
+                        </p:par>
+                      </p:childTnLst>
+                    </p:cTn>
+                  </p:par>
+                </p:childTnLst>
+              </p:cTn>
+              <p:prevCondLst>
+                <p:cond evt="onPrev" delay="0">
+                  <p:tgtEl>
+                    <p:sldTgt/>
+                  </p:tgtEl>
+                </p:cond>
+              </p:prevCondLst>
+              <p:nextCondLst>
+                <p:cond evt="onNext" delay="0">
+                  <p:tgtEl>
+                    <p:sldTgt/>
+                  </p:tgtEl>
+                </p:cond>
+              </p:nextCondLst>
+            </p:seq>
+          </p:childTnLst>
+        </p:cTn>
+      </p:par>
+    </p:tnLst>
+  </p:timing>
 </p:sld>
 </file>
 
@@ -5127,6 +6984,117 @@
               <a:rPr lang="en-US" dirty="0"/>
               <a:t> Example:  There are structures like trees where iteration is not ideal</a:t>
             </a:r>
+          </a:p>
+          <a:p>
+            <a:pPr marL="0" indent="0">
+              <a:buNone/>
+            </a:pPr>
+            <a:endParaRPr lang="en-US" dirty="0"/>
+          </a:p>
+        </p:txBody>
+      </p:sp>
+      <p:pic>
+        <p:nvPicPr>
+          <p:cNvPr id="4" name="Picture 2">
+            <a:extLst>
+              <a:ext uri="{FF2B5EF4-FFF2-40B4-BE49-F238E27FC236}">
+                <a16:creationId xmlns:a16="http://schemas.microsoft.com/office/drawing/2014/main" id="{7BD8AF2C-DE2E-4068-AF58-BA258BF1DAB7}"/>
+              </a:ext>
+            </a:extLst>
+          </p:cNvPr>
+          <p:cNvPicPr>
+            <a:picLocks noChangeAspect="1" noChangeArrowheads="1"/>
+          </p:cNvPicPr>
+          <p:nvPr/>
+        </p:nvPicPr>
+        <p:blipFill>
+          <a:blip r:embed="rId2">
+            <a:extLst>
+              <a:ext uri="{28A0092B-C50C-407E-A947-70E740481C1C}">
+                <a14:useLocalDpi xmlns:a14="http://schemas.microsoft.com/office/drawing/2010/main" val="0"/>
+              </a:ext>
+            </a:extLst>
+          </a:blip>
+          <a:srcRect/>
+          <a:stretch>
+            <a:fillRect/>
+          </a:stretch>
+        </p:blipFill>
+        <p:spPr bwMode="auto">
+          <a:xfrm>
+            <a:off x="2843379" y="4044812"/>
+            <a:ext cx="3658721" cy="2132151"/>
+          </a:xfrm>
+          <a:prstGeom prst="rect">
+            <a:avLst/>
+          </a:prstGeom>
+          <a:noFill/>
+          <a:extLst>
+            <a:ext uri="{909E8E84-426E-40DD-AFC4-6F175D3DCCD1}">
+              <a14:hiddenFill xmlns:a14="http://schemas.microsoft.com/office/drawing/2010/main">
+                <a:solidFill>
+                  <a:srgbClr val="FFFFFF"/>
+                </a:solidFill>
+              </a14:hiddenFill>
+            </a:ext>
+          </a:extLst>
+        </p:spPr>
+      </p:pic>
+      <p:sp>
+        <p:nvSpPr>
+          <p:cNvPr id="5" name="Footer Placeholder 4">
+            <a:extLst>
+              <a:ext uri="{FF2B5EF4-FFF2-40B4-BE49-F238E27FC236}">
+                <a16:creationId xmlns:a16="http://schemas.microsoft.com/office/drawing/2014/main" id="{39F0D516-E7DD-45D1-8248-900C48038A8C}"/>
+              </a:ext>
+            </a:extLst>
+          </p:cNvPr>
+          <p:cNvSpPr>
+            <a:spLocks noGrp="1"/>
+          </p:cNvSpPr>
+          <p:nvPr>
+            <p:ph type="ftr" sz="quarter" idx="11"/>
+          </p:nvPr>
+        </p:nvSpPr>
+        <p:spPr/>
+        <p:txBody>
+          <a:bodyPr/>
+          <a:lstStyle/>
+          <a:p>
+            <a:r>
+              <a:rPr lang="en-US"/>
+              <a:t>https://github.com/avifarah/Recurson</a:t>
+            </a:r>
+            <a:endParaRPr lang="en-US" dirty="0"/>
+          </a:p>
+        </p:txBody>
+      </p:sp>
+      <p:sp>
+        <p:nvSpPr>
+          <p:cNvPr id="6" name="Slide Number Placeholder 5">
+            <a:extLst>
+              <a:ext uri="{FF2B5EF4-FFF2-40B4-BE49-F238E27FC236}">
+                <a16:creationId xmlns:a16="http://schemas.microsoft.com/office/drawing/2014/main" id="{A608D07E-8C75-4AE8-B355-303407932BDD}"/>
+              </a:ext>
+            </a:extLst>
+          </p:cNvPr>
+          <p:cNvSpPr>
+            <a:spLocks noGrp="1"/>
+          </p:cNvSpPr>
+          <p:nvPr>
+            <p:ph type="sldNum" sz="quarter" idx="12"/>
+          </p:nvPr>
+        </p:nvSpPr>
+        <p:spPr/>
+        <p:txBody>
+          <a:bodyPr/>
+          <a:lstStyle/>
+          <a:p>
+            <a:fld id="{AED3D424-D5FA-4721-A71E-77CBBB5C48D0}" type="slidenum">
+              <a:rPr lang="en-US" smtClean="0"/>
+              <a:t>4</a:t>
+            </a:fld>
+            <a:endParaRPr lang="en-US" dirty="0"/>
           </a:p>
         </p:txBody>
       </p:sp>
@@ -5239,7 +7207,7 @@
             </a:pPr>
             <a:r>
               <a:rPr lang="en-US" dirty="0"/>
-              <a:t> Upon return: this complex frame is popped, when local variables are rehydrated.</a:t>
+              <a:t> Upon return: top frame is popped and hydrate local variables.</a:t>
             </a:r>
           </a:p>
           <a:p>
@@ -5274,6 +7242,64 @@
             <a:pPr marL="0" indent="0">
               <a:buNone/>
             </a:pPr>
+            <a:endParaRPr lang="en-US" dirty="0"/>
+          </a:p>
+        </p:txBody>
+      </p:sp>
+      <p:sp>
+        <p:nvSpPr>
+          <p:cNvPr id="4" name="Footer Placeholder 3">
+            <a:extLst>
+              <a:ext uri="{FF2B5EF4-FFF2-40B4-BE49-F238E27FC236}">
+                <a16:creationId xmlns:a16="http://schemas.microsoft.com/office/drawing/2014/main" id="{26BF62A1-CE0F-4813-9C1F-73CEA0150B15}"/>
+              </a:ext>
+            </a:extLst>
+          </p:cNvPr>
+          <p:cNvSpPr>
+            <a:spLocks noGrp="1"/>
+          </p:cNvSpPr>
+          <p:nvPr>
+            <p:ph type="ftr" sz="quarter" idx="11"/>
+          </p:nvPr>
+        </p:nvSpPr>
+        <p:spPr/>
+        <p:txBody>
+          <a:bodyPr/>
+          <a:lstStyle/>
+          <a:p>
+            <a:r>
+              <a:rPr lang="en-US"/>
+              <a:t>https://github.com/avifarah/Recurson</a:t>
+            </a:r>
+            <a:endParaRPr lang="en-US" dirty="0"/>
+          </a:p>
+        </p:txBody>
+      </p:sp>
+      <p:sp>
+        <p:nvSpPr>
+          <p:cNvPr id="5" name="Slide Number Placeholder 4">
+            <a:extLst>
+              <a:ext uri="{FF2B5EF4-FFF2-40B4-BE49-F238E27FC236}">
+                <a16:creationId xmlns:a16="http://schemas.microsoft.com/office/drawing/2014/main" id="{A1A46689-254F-48ED-A7EC-3FABDE41BDDB}"/>
+              </a:ext>
+            </a:extLst>
+          </p:cNvPr>
+          <p:cNvSpPr>
+            <a:spLocks noGrp="1"/>
+          </p:cNvSpPr>
+          <p:nvPr>
+            <p:ph type="sldNum" sz="quarter" idx="12"/>
+          </p:nvPr>
+        </p:nvSpPr>
+        <p:spPr/>
+        <p:txBody>
+          <a:bodyPr/>
+          <a:lstStyle/>
+          <a:p>
+            <a:fld id="{AED3D424-D5FA-4721-A71E-77CBBB5C48D0}" type="slidenum">
+              <a:rPr lang="en-US" smtClean="0"/>
+              <a:t>5</a:t>
+            </a:fld>
             <a:endParaRPr lang="en-US" dirty="0"/>
           </a:p>
         </p:txBody>
@@ -5661,7 +7687,7 @@
                 </a:solidFill>
                 <a:latin typeface="Consolas" panose="020B0609020204030204" pitchFamily="49" charset="0"/>
               </a:rPr>
-              <a:t>	if</a:t>
+              <a:t>  if</a:t>
             </a:r>
             <a:r>
               <a:rPr lang="en-US" sz="2400" dirty="0">
@@ -5688,7 +7714,7 @@
                 </a:solidFill>
                 <a:latin typeface="Consolas" panose="020B0609020204030204" pitchFamily="49" charset="0"/>
               </a:rPr>
-              <a:t>) </a:t>
+              <a:t>) 	</a:t>
             </a:r>
             <a:r>
               <a:rPr lang="en-US" sz="2400" dirty="0">
@@ -5737,6 +7763,15 @@
             <a:r>
               <a:rPr lang="en-US" sz="2400" dirty="0">
                 <a:solidFill>
+                  <a:srgbClr val="000000"/>
+                </a:solidFill>
+                <a:latin typeface="Consolas" panose="020B0609020204030204" pitchFamily="49" charset="0"/>
+              </a:rPr>
+              <a:t>  </a:t>
+            </a:r>
+            <a:r>
+              <a:rPr lang="en-US" sz="2400" dirty="0">
+                <a:solidFill>
                   <a:srgbClr val="00B050"/>
                 </a:solidFill>
                 <a:latin typeface="Consolas" panose="020B0609020204030204" pitchFamily="49" charset="0"/>
@@ -5818,7 +7853,7 @@
                 </a:solidFill>
                 <a:latin typeface="Consolas" panose="020B0609020204030204" pitchFamily="49" charset="0"/>
               </a:rPr>
-              <a:t>/*option 2*/</a:t>
+              <a:t>  /*option 2*/</a:t>
             </a:r>
             <a:r>
               <a:rPr lang="pt-BR" dirty="0">
@@ -5923,6 +7958,64 @@
               <a:rPr lang="en-US" dirty="0"/>
               <a:t>The compiler will turn a Tail Recursion to an iteration.</a:t>
             </a:r>
+          </a:p>
+        </p:txBody>
+      </p:sp>
+      <p:sp>
+        <p:nvSpPr>
+          <p:cNvPr id="4" name="Footer Placeholder 3">
+            <a:extLst>
+              <a:ext uri="{FF2B5EF4-FFF2-40B4-BE49-F238E27FC236}">
+                <a16:creationId xmlns:a16="http://schemas.microsoft.com/office/drawing/2014/main" id="{2398CE13-0AA3-4F35-8E65-B24F32B0C2B5}"/>
+              </a:ext>
+            </a:extLst>
+          </p:cNvPr>
+          <p:cNvSpPr>
+            <a:spLocks noGrp="1"/>
+          </p:cNvSpPr>
+          <p:nvPr>
+            <p:ph type="ftr" sz="quarter" idx="11"/>
+          </p:nvPr>
+        </p:nvSpPr>
+        <p:spPr/>
+        <p:txBody>
+          <a:bodyPr/>
+          <a:lstStyle/>
+          <a:p>
+            <a:r>
+              <a:rPr lang="en-US"/>
+              <a:t>https://github.com/avifarah/Recurson</a:t>
+            </a:r>
+            <a:endParaRPr lang="en-US" dirty="0"/>
+          </a:p>
+        </p:txBody>
+      </p:sp>
+      <p:sp>
+        <p:nvSpPr>
+          <p:cNvPr id="5" name="Slide Number Placeholder 4">
+            <a:extLst>
+              <a:ext uri="{FF2B5EF4-FFF2-40B4-BE49-F238E27FC236}">
+                <a16:creationId xmlns:a16="http://schemas.microsoft.com/office/drawing/2014/main" id="{81FDD663-CD81-415D-8772-1D058473D279}"/>
+              </a:ext>
+            </a:extLst>
+          </p:cNvPr>
+          <p:cNvSpPr>
+            <a:spLocks noGrp="1"/>
+          </p:cNvSpPr>
+          <p:nvPr>
+            <p:ph type="sldNum" sz="quarter" idx="12"/>
+          </p:nvPr>
+        </p:nvSpPr>
+        <p:spPr/>
+        <p:txBody>
+          <a:bodyPr/>
+          <a:lstStyle/>
+          <a:p>
+            <a:fld id="{AED3D424-D5FA-4721-A71E-77CBBB5C48D0}" type="slidenum">
+              <a:rPr lang="en-US" smtClean="0"/>
+              <a:t>6</a:t>
+            </a:fld>
+            <a:endParaRPr lang="en-US" dirty="0"/>
           </a:p>
         </p:txBody>
       </p:sp>
@@ -5972,7 +8065,12 @@
             <p:ph type="title"/>
           </p:nvPr>
         </p:nvSpPr>
-        <p:spPr/>
+        <p:spPr>
+          <a:xfrm>
+            <a:off x="838200" y="365125"/>
+            <a:ext cx="10515600" cy="1108673"/>
+          </a:xfrm>
+        </p:spPr>
         <p:txBody>
           <a:bodyPr/>
           <a:lstStyle/>
@@ -6158,6 +8256,94 @@
           </a:p>
         </p:txBody>
       </p:sp>
+      <p:pic>
+        <p:nvPicPr>
+          <p:cNvPr id="5" name="Picture 4">
+            <a:extLst>
+              <a:ext uri="{FF2B5EF4-FFF2-40B4-BE49-F238E27FC236}">
+                <a16:creationId xmlns:a16="http://schemas.microsoft.com/office/drawing/2014/main" id="{C49001DB-73E2-4D0E-BCEC-0B3E1F41C6FB}"/>
+              </a:ext>
+            </a:extLst>
+          </p:cNvPr>
+          <p:cNvPicPr>
+            <a:picLocks noChangeAspect="1"/>
+          </p:cNvPicPr>
+          <p:nvPr/>
+        </p:nvPicPr>
+        <p:blipFill>
+          <a:blip r:embed="rId2"/>
+          <a:stretch>
+            <a:fillRect/>
+          </a:stretch>
+        </p:blipFill>
+        <p:spPr>
+          <a:xfrm>
+            <a:off x="8875059" y="1955268"/>
+            <a:ext cx="2478741" cy="2141080"/>
+          </a:xfrm>
+          <a:prstGeom prst="rect">
+            <a:avLst/>
+          </a:prstGeom>
+        </p:spPr>
+      </p:pic>
+      <p:sp>
+        <p:nvSpPr>
+          <p:cNvPr id="6" name="Footer Placeholder 5">
+            <a:extLst>
+              <a:ext uri="{FF2B5EF4-FFF2-40B4-BE49-F238E27FC236}">
+                <a16:creationId xmlns:a16="http://schemas.microsoft.com/office/drawing/2014/main" id="{10ECF526-B2C2-44B3-A93C-45A83A0D30E6}"/>
+              </a:ext>
+            </a:extLst>
+          </p:cNvPr>
+          <p:cNvSpPr>
+            <a:spLocks noGrp="1"/>
+          </p:cNvSpPr>
+          <p:nvPr>
+            <p:ph type="ftr" sz="quarter" idx="11"/>
+          </p:nvPr>
+        </p:nvSpPr>
+        <p:spPr/>
+        <p:txBody>
+          <a:bodyPr/>
+          <a:lstStyle/>
+          <a:p>
+            <a:r>
+              <a:rPr lang="en-US"/>
+              <a:t>https://github.com/avifarah/Recurson</a:t>
+            </a:r>
+            <a:endParaRPr lang="en-US" dirty="0"/>
+          </a:p>
+        </p:txBody>
+      </p:sp>
+      <p:sp>
+        <p:nvSpPr>
+          <p:cNvPr id="7" name="Slide Number Placeholder 6">
+            <a:extLst>
+              <a:ext uri="{FF2B5EF4-FFF2-40B4-BE49-F238E27FC236}">
+                <a16:creationId xmlns:a16="http://schemas.microsoft.com/office/drawing/2014/main" id="{45956E40-F15B-422E-A84E-106F30078224}"/>
+              </a:ext>
+            </a:extLst>
+          </p:cNvPr>
+          <p:cNvSpPr>
+            <a:spLocks noGrp="1"/>
+          </p:cNvSpPr>
+          <p:nvPr>
+            <p:ph type="sldNum" sz="quarter" idx="12"/>
+          </p:nvPr>
+        </p:nvSpPr>
+        <p:spPr/>
+        <p:txBody>
+          <a:bodyPr/>
+          <a:lstStyle/>
+          <a:p>
+            <a:fld id="{AED3D424-D5FA-4721-A71E-77CBBB5C48D0}" type="slidenum">
+              <a:rPr lang="en-US" smtClean="0"/>
+              <a:t>7</a:t>
+            </a:fld>
+            <a:endParaRPr lang="en-US" dirty="0"/>
+          </a:p>
+        </p:txBody>
+      </p:sp>
     </p:spTree>
     <p:extLst>
       <p:ext uri="{BB962C8B-B14F-4D97-AF65-F5344CB8AC3E}">
@@ -6168,6 +8354,345 @@
   <p:clrMapOvr>
     <a:masterClrMapping/>
   </p:clrMapOvr>
+  <p:timing>
+    <p:tnLst>
+      <p:par>
+        <p:cTn id="1" dur="indefinite" restart="never" nodeType="tmRoot">
+          <p:childTnLst>
+            <p:seq concurrent="1" nextAc="seek">
+              <p:cTn id="2" dur="indefinite" nodeType="mainSeq">
+                <p:childTnLst>
+                  <p:par>
+                    <p:cTn id="3" fill="hold">
+                      <p:stCondLst>
+                        <p:cond delay="indefinite"/>
+                      </p:stCondLst>
+                      <p:childTnLst>
+                        <p:par>
+                          <p:cTn id="4" fill="hold">
+                            <p:stCondLst>
+                              <p:cond delay="0"/>
+                            </p:stCondLst>
+                            <p:childTnLst>
+                              <p:par>
+                                <p:cTn id="5" presetID="2" presetClass="entr" presetSubtype="4" fill="hold" nodeType="clickEffect">
+                                  <p:stCondLst>
+                                    <p:cond delay="0"/>
+                                  </p:stCondLst>
+                                  <p:childTnLst>
+                                    <p:set>
+                                      <p:cBhvr>
+                                        <p:cTn id="6" dur="1" fill="hold">
+                                          <p:stCondLst>
+                                            <p:cond delay="0"/>
+                                          </p:stCondLst>
+                                        </p:cTn>
+                                        <p:tgtEl>
+                                          <p:spTgt spid="3">
+                                            <p:txEl>
+                                              <p:pRg st="3" end="3"/>
+                                            </p:txEl>
+                                          </p:spTgt>
+                                        </p:tgtEl>
+                                        <p:attrNameLst>
+                                          <p:attrName>style.visibility</p:attrName>
+                                        </p:attrNameLst>
+                                      </p:cBhvr>
+                                      <p:to>
+                                        <p:strVal val="visible"/>
+                                      </p:to>
+                                    </p:set>
+                                    <p:anim calcmode="lin" valueType="num">
+                                      <p:cBhvr additive="base">
+                                        <p:cTn id="7" dur="500" fill="hold"/>
+                                        <p:tgtEl>
+                                          <p:spTgt spid="3">
+                                            <p:txEl>
+                                              <p:pRg st="3" end="3"/>
+                                            </p:txEl>
+                                          </p:spTgt>
+                                        </p:tgtEl>
+                                        <p:attrNameLst>
+                                          <p:attrName>ppt_x</p:attrName>
+                                        </p:attrNameLst>
+                                      </p:cBhvr>
+                                      <p:tavLst>
+                                        <p:tav tm="0">
+                                          <p:val>
+                                            <p:strVal val="#ppt_x"/>
+                                          </p:val>
+                                        </p:tav>
+                                        <p:tav tm="100000">
+                                          <p:val>
+                                            <p:strVal val="#ppt_x"/>
+                                          </p:val>
+                                        </p:tav>
+                                      </p:tavLst>
+                                    </p:anim>
+                                    <p:anim calcmode="lin" valueType="num">
+                                      <p:cBhvr additive="base">
+                                        <p:cTn id="8" dur="500" fill="hold"/>
+                                        <p:tgtEl>
+                                          <p:spTgt spid="3">
+                                            <p:txEl>
+                                              <p:pRg st="3" end="3"/>
+                                            </p:txEl>
+                                          </p:spTgt>
+                                        </p:tgtEl>
+                                        <p:attrNameLst>
+                                          <p:attrName>ppt_y</p:attrName>
+                                        </p:attrNameLst>
+                                      </p:cBhvr>
+                                      <p:tavLst>
+                                        <p:tav tm="0">
+                                          <p:val>
+                                            <p:strVal val="1+#ppt_h/2"/>
+                                          </p:val>
+                                        </p:tav>
+                                        <p:tav tm="100000">
+                                          <p:val>
+                                            <p:strVal val="#ppt_y"/>
+                                          </p:val>
+                                        </p:tav>
+                                      </p:tavLst>
+                                    </p:anim>
+                                  </p:childTnLst>
+                                </p:cTn>
+                              </p:par>
+                            </p:childTnLst>
+                          </p:cTn>
+                        </p:par>
+                      </p:childTnLst>
+                    </p:cTn>
+                  </p:par>
+                  <p:par>
+                    <p:cTn id="9" fill="hold">
+                      <p:stCondLst>
+                        <p:cond delay="indefinite"/>
+                      </p:stCondLst>
+                      <p:childTnLst>
+                        <p:par>
+                          <p:cTn id="10" fill="hold">
+                            <p:stCondLst>
+                              <p:cond delay="0"/>
+                            </p:stCondLst>
+                            <p:childTnLst>
+                              <p:par>
+                                <p:cTn id="11" presetID="2" presetClass="entr" presetSubtype="4" fill="hold" nodeType="clickEffect">
+                                  <p:stCondLst>
+                                    <p:cond delay="0"/>
+                                  </p:stCondLst>
+                                  <p:childTnLst>
+                                    <p:set>
+                                      <p:cBhvr>
+                                        <p:cTn id="12" dur="1" fill="hold">
+                                          <p:stCondLst>
+                                            <p:cond delay="0"/>
+                                          </p:stCondLst>
+                                        </p:cTn>
+                                        <p:tgtEl>
+                                          <p:spTgt spid="3">
+                                            <p:txEl>
+                                              <p:pRg st="4" end="4"/>
+                                            </p:txEl>
+                                          </p:spTgt>
+                                        </p:tgtEl>
+                                        <p:attrNameLst>
+                                          <p:attrName>style.visibility</p:attrName>
+                                        </p:attrNameLst>
+                                      </p:cBhvr>
+                                      <p:to>
+                                        <p:strVal val="visible"/>
+                                      </p:to>
+                                    </p:set>
+                                    <p:anim calcmode="lin" valueType="num">
+                                      <p:cBhvr additive="base">
+                                        <p:cTn id="13" dur="500" fill="hold"/>
+                                        <p:tgtEl>
+                                          <p:spTgt spid="3">
+                                            <p:txEl>
+                                              <p:pRg st="4" end="4"/>
+                                            </p:txEl>
+                                          </p:spTgt>
+                                        </p:tgtEl>
+                                        <p:attrNameLst>
+                                          <p:attrName>ppt_x</p:attrName>
+                                        </p:attrNameLst>
+                                      </p:cBhvr>
+                                      <p:tavLst>
+                                        <p:tav tm="0">
+                                          <p:val>
+                                            <p:strVal val="#ppt_x"/>
+                                          </p:val>
+                                        </p:tav>
+                                        <p:tav tm="100000">
+                                          <p:val>
+                                            <p:strVal val="#ppt_x"/>
+                                          </p:val>
+                                        </p:tav>
+                                      </p:tavLst>
+                                    </p:anim>
+                                    <p:anim calcmode="lin" valueType="num">
+                                      <p:cBhvr additive="base">
+                                        <p:cTn id="14" dur="500" fill="hold"/>
+                                        <p:tgtEl>
+                                          <p:spTgt spid="3">
+                                            <p:txEl>
+                                              <p:pRg st="4" end="4"/>
+                                            </p:txEl>
+                                          </p:spTgt>
+                                        </p:tgtEl>
+                                        <p:attrNameLst>
+                                          <p:attrName>ppt_y</p:attrName>
+                                        </p:attrNameLst>
+                                      </p:cBhvr>
+                                      <p:tavLst>
+                                        <p:tav tm="0">
+                                          <p:val>
+                                            <p:strVal val="1+#ppt_h/2"/>
+                                          </p:val>
+                                        </p:tav>
+                                        <p:tav tm="100000">
+                                          <p:val>
+                                            <p:strVal val="#ppt_y"/>
+                                          </p:val>
+                                        </p:tav>
+                                      </p:tavLst>
+                                    </p:anim>
+                                  </p:childTnLst>
+                                </p:cTn>
+                              </p:par>
+                            </p:childTnLst>
+                          </p:cTn>
+                        </p:par>
+                      </p:childTnLst>
+                    </p:cTn>
+                  </p:par>
+                  <p:par>
+                    <p:cTn id="15" fill="hold">
+                      <p:stCondLst>
+                        <p:cond delay="indefinite"/>
+                      </p:stCondLst>
+                      <p:childTnLst>
+                        <p:par>
+                          <p:cTn id="16" fill="hold">
+                            <p:stCondLst>
+                              <p:cond delay="0"/>
+                            </p:stCondLst>
+                            <p:childTnLst>
+                              <p:par>
+                                <p:cTn id="17" presetID="2" presetClass="entr" presetSubtype="4" fill="hold" nodeType="clickEffect">
+                                  <p:stCondLst>
+                                    <p:cond delay="0"/>
+                                  </p:stCondLst>
+                                  <p:childTnLst>
+                                    <p:set>
+                                      <p:cBhvr>
+                                        <p:cTn id="18" dur="1" fill="hold">
+                                          <p:stCondLst>
+                                            <p:cond delay="0"/>
+                                          </p:stCondLst>
+                                        </p:cTn>
+                                        <p:tgtEl>
+                                          <p:spTgt spid="3">
+                                            <p:txEl>
+                                              <p:pRg st="5" end="5"/>
+                                            </p:txEl>
+                                          </p:spTgt>
+                                        </p:tgtEl>
+                                        <p:attrNameLst>
+                                          <p:attrName>style.visibility</p:attrName>
+                                        </p:attrNameLst>
+                                      </p:cBhvr>
+                                      <p:to>
+                                        <p:strVal val="visible"/>
+                                      </p:to>
+                                    </p:set>
+                                    <p:anim calcmode="lin" valueType="num">
+                                      <p:cBhvr additive="base">
+                                        <p:cTn id="19" dur="500" fill="hold"/>
+                                        <p:tgtEl>
+                                          <p:spTgt spid="3">
+                                            <p:txEl>
+                                              <p:pRg st="5" end="5"/>
+                                            </p:txEl>
+                                          </p:spTgt>
+                                        </p:tgtEl>
+                                        <p:attrNameLst>
+                                          <p:attrName>ppt_x</p:attrName>
+                                        </p:attrNameLst>
+                                      </p:cBhvr>
+                                      <p:tavLst>
+                                        <p:tav tm="0">
+                                          <p:val>
+                                            <p:strVal val="#ppt_x"/>
+                                          </p:val>
+                                        </p:tav>
+                                        <p:tav tm="100000">
+                                          <p:val>
+                                            <p:strVal val="#ppt_x"/>
+                                          </p:val>
+                                        </p:tav>
+                                      </p:tavLst>
+                                    </p:anim>
+                                    <p:anim calcmode="lin" valueType="num">
+                                      <p:cBhvr additive="base">
+                                        <p:cTn id="20" dur="500" fill="hold"/>
+                                        <p:tgtEl>
+                                          <p:spTgt spid="3">
+                                            <p:txEl>
+                                              <p:pRg st="5" end="5"/>
+                                            </p:txEl>
+                                          </p:spTgt>
+                                        </p:tgtEl>
+                                        <p:attrNameLst>
+                                          <p:attrName>ppt_y</p:attrName>
+                                        </p:attrNameLst>
+                                      </p:cBhvr>
+                                      <p:tavLst>
+                                        <p:tav tm="0">
+                                          <p:val>
+                                            <p:strVal val="1+#ppt_h/2"/>
+                                          </p:val>
+                                        </p:tav>
+                                        <p:tav tm="100000">
+                                          <p:val>
+                                            <p:strVal val="#ppt_y"/>
+                                          </p:val>
+                                        </p:tav>
+                                      </p:tavLst>
+                                    </p:anim>
+                                  </p:childTnLst>
+                                </p:cTn>
+                              </p:par>
+                            </p:childTnLst>
+                          </p:cTn>
+                        </p:par>
+                      </p:childTnLst>
+                    </p:cTn>
+                  </p:par>
+                </p:childTnLst>
+              </p:cTn>
+              <p:prevCondLst>
+                <p:cond evt="onPrev" delay="0">
+                  <p:tgtEl>
+                    <p:sldTgt/>
+                  </p:tgtEl>
+                </p:cond>
+              </p:prevCondLst>
+              <p:nextCondLst>
+                <p:cond evt="onNext" delay="0">
+                  <p:tgtEl>
+                    <p:sldTgt/>
+                  </p:tgtEl>
+                </p:cond>
+              </p:nextCondLst>
+            </p:seq>
+          </p:childTnLst>
+        </p:cTn>
+      </p:par>
+    </p:tnLst>
+  </p:timing>
 </p:sld>
 </file>
 
@@ -6420,6 +8945,64 @@
           </a:extLst>
         </p:spPr>
       </p:pic>
+      <p:sp>
+        <p:nvSpPr>
+          <p:cNvPr id="4" name="Footer Placeholder 3">
+            <a:extLst>
+              <a:ext uri="{FF2B5EF4-FFF2-40B4-BE49-F238E27FC236}">
+                <a16:creationId xmlns:a16="http://schemas.microsoft.com/office/drawing/2014/main" id="{BA41F30A-5060-4469-AB07-AC9082674B89}"/>
+              </a:ext>
+            </a:extLst>
+          </p:cNvPr>
+          <p:cNvSpPr>
+            <a:spLocks noGrp="1"/>
+          </p:cNvSpPr>
+          <p:nvPr>
+            <p:ph type="ftr" sz="quarter" idx="11"/>
+          </p:nvPr>
+        </p:nvSpPr>
+        <p:spPr/>
+        <p:txBody>
+          <a:bodyPr/>
+          <a:lstStyle/>
+          <a:p>
+            <a:r>
+              <a:rPr lang="en-US"/>
+              <a:t>https://github.com/avifarah/Recurson</a:t>
+            </a:r>
+            <a:endParaRPr lang="en-US" dirty="0"/>
+          </a:p>
+        </p:txBody>
+      </p:sp>
+      <p:sp>
+        <p:nvSpPr>
+          <p:cNvPr id="6" name="Slide Number Placeholder 5">
+            <a:extLst>
+              <a:ext uri="{FF2B5EF4-FFF2-40B4-BE49-F238E27FC236}">
+                <a16:creationId xmlns:a16="http://schemas.microsoft.com/office/drawing/2014/main" id="{D98CF064-254F-4166-95A5-22091678856B}"/>
+              </a:ext>
+            </a:extLst>
+          </p:cNvPr>
+          <p:cNvSpPr>
+            <a:spLocks noGrp="1"/>
+          </p:cNvSpPr>
+          <p:nvPr>
+            <p:ph type="sldNum" sz="quarter" idx="12"/>
+          </p:nvPr>
+        </p:nvSpPr>
+        <p:spPr/>
+        <p:txBody>
+          <a:bodyPr/>
+          <a:lstStyle/>
+          <a:p>
+            <a:fld id="{AED3D424-D5FA-4721-A71E-77CBBB5C48D0}" type="slidenum">
+              <a:rPr lang="en-US" smtClean="0"/>
+              <a:t>8</a:t>
+            </a:fld>
+            <a:endParaRPr lang="en-US" dirty="0"/>
+          </a:p>
+        </p:txBody>
+      </p:sp>
     </p:spTree>
     <p:extLst>
       <p:ext uri="{BB962C8B-B14F-4D97-AF65-F5344CB8AC3E}">
@@ -6478,8 +9061,8 @@
           </a:p>
         </p:txBody>
       </p:sp>
-      <mc:AlternateContent xmlns:mc="http://schemas.openxmlformats.org/markup-compatibility/2006">
-        <mc:Choice xmlns:a14="http://schemas.microsoft.com/office/drawing/2010/main" Requires="a14">
+      <mc:AlternateContent xmlns:mc="http://schemas.openxmlformats.org/markup-compatibility/2006" xmlns:a14="http://schemas.microsoft.com/office/drawing/2010/main">
+        <mc:Choice Requires="a14">
           <p:sp>
             <p:nvSpPr>
               <p:cNvPr id="3" name="Content Placeholder 2">
@@ -6522,15 +9105,7 @@
               <a:p>
                 <a:r>
                   <a:rPr lang="en-US" dirty="0"/>
-                  <a:t>Then our observed pattern holds for the (n + 1)’</a:t>
-                </a:r>
-                <a:r>
-                  <a:rPr lang="en-US" dirty="0" err="1"/>
-                  <a:t>st</a:t>
-                </a:r>
-                <a:r>
-                  <a:rPr lang="en-US" dirty="0"/>
-                  <a:t> case.</a:t>
+                  <a:t>Then our observed pattern holds for the (n + 1)’st case.</a:t>
                 </a:r>
               </a:p>
               <a:p>
@@ -7504,7 +10079,7 @@
             </p:txBody>
           </p:sp>
         </mc:Choice>
-        <mc:Fallback>
+        <mc:Fallback xmlns="">
           <p:sp>
             <p:nvSpPr>
               <p:cNvPr id="3" name="Content Placeholder 2">
@@ -7548,6 +10123,64 @@
           </p:sp>
         </mc:Fallback>
       </mc:AlternateContent>
+      <p:sp>
+        <p:nvSpPr>
+          <p:cNvPr id="4" name="Footer Placeholder 3">
+            <a:extLst>
+              <a:ext uri="{FF2B5EF4-FFF2-40B4-BE49-F238E27FC236}">
+                <a16:creationId xmlns:a16="http://schemas.microsoft.com/office/drawing/2014/main" id="{A79FAFE4-BA3F-4BE5-8B36-BF5B982F4C4F}"/>
+              </a:ext>
+            </a:extLst>
+          </p:cNvPr>
+          <p:cNvSpPr>
+            <a:spLocks noGrp="1"/>
+          </p:cNvSpPr>
+          <p:nvPr>
+            <p:ph type="ftr" sz="quarter" idx="11"/>
+          </p:nvPr>
+        </p:nvSpPr>
+        <p:spPr/>
+        <p:txBody>
+          <a:bodyPr/>
+          <a:lstStyle/>
+          <a:p>
+            <a:r>
+              <a:rPr lang="en-US"/>
+              <a:t>https://github.com/avifarah/Recurson</a:t>
+            </a:r>
+            <a:endParaRPr lang="en-US" dirty="0"/>
+          </a:p>
+        </p:txBody>
+      </p:sp>
+      <p:sp>
+        <p:nvSpPr>
+          <p:cNvPr id="5" name="Slide Number Placeholder 4">
+            <a:extLst>
+              <a:ext uri="{FF2B5EF4-FFF2-40B4-BE49-F238E27FC236}">
+                <a16:creationId xmlns:a16="http://schemas.microsoft.com/office/drawing/2014/main" id="{FD4ACDC9-54CE-40CD-AE1B-7CA37BF54638}"/>
+              </a:ext>
+            </a:extLst>
+          </p:cNvPr>
+          <p:cNvSpPr>
+            <a:spLocks noGrp="1"/>
+          </p:cNvSpPr>
+          <p:nvPr>
+            <p:ph type="sldNum" sz="quarter" idx="12"/>
+          </p:nvPr>
+        </p:nvSpPr>
+        <p:spPr/>
+        <p:txBody>
+          <a:bodyPr/>
+          <a:lstStyle/>
+          <a:p>
+            <a:fld id="{AED3D424-D5FA-4721-A71E-77CBBB5C48D0}" type="slidenum">
+              <a:rPr lang="en-US" smtClean="0"/>
+              <a:t>9</a:t>
+            </a:fld>
+            <a:endParaRPr lang="en-US" dirty="0"/>
+          </a:p>
+        </p:txBody>
+      </p:sp>
     </p:spTree>
     <p:extLst>
       <p:ext uri="{BB962C8B-B14F-4D97-AF65-F5344CB8AC3E}">
@@ -7854,4 +10487,299 @@
     </a:ext>
   </a:extLst>
 </a:theme>
+</file>
+
+<file path=ppt/theme/theme2.xml><?xml version="1.0" encoding="utf-8"?>
+<a:theme xmlns:a="http://schemas.openxmlformats.org/drawingml/2006/main" name="Office Theme">
+  <a:themeElements>
+    <a:clrScheme name="Office">
+      <a:dk1>
+        <a:sysClr val="windowText" lastClr="000000"/>
+      </a:dk1>
+      <a:lt1>
+        <a:sysClr val="window" lastClr="FFFFFF"/>
+      </a:lt1>
+      <a:dk2>
+        <a:srgbClr val="44546A"/>
+      </a:dk2>
+      <a:lt2>
+        <a:srgbClr val="E7E6E6"/>
+      </a:lt2>
+      <a:accent1>
+        <a:srgbClr val="4472C4"/>
+      </a:accent1>
+      <a:accent2>
+        <a:srgbClr val="ED7D31"/>
+      </a:accent2>
+      <a:accent3>
+        <a:srgbClr val="A5A5A5"/>
+      </a:accent3>
+      <a:accent4>
+        <a:srgbClr val="FFC000"/>
+      </a:accent4>
+      <a:accent5>
+        <a:srgbClr val="5B9BD5"/>
+      </a:accent5>
+      <a:accent6>
+        <a:srgbClr val="70AD47"/>
+      </a:accent6>
+      <a:hlink>
+        <a:srgbClr val="0563C1"/>
+      </a:hlink>
+      <a:folHlink>
+        <a:srgbClr val="954F72"/>
+      </a:folHlink>
+    </a:clrScheme>
+    <a:fontScheme name="Office">
+      <a:majorFont>
+        <a:latin typeface="Calibri Light" panose="020F0302020204030204"/>
+        <a:ea typeface=""/>
+        <a:cs typeface=""/>
+        <a:font script="Jpan" typeface="游ゴシック Light"/>
+        <a:font script="Hang" typeface="맑은 고딕"/>
+        <a:font script="Hans" typeface="等线 Light"/>
+        <a:font script="Hant" typeface="新細明體"/>
+        <a:font script="Arab" typeface="Times New Roman"/>
+        <a:font script="Hebr" typeface="Times New Roman"/>
+        <a:font script="Thai" typeface="Angsana New"/>
+        <a:font script="Ethi" typeface="Nyala"/>
+        <a:font script="Beng" typeface="Vrinda"/>
+        <a:font script="Gujr" typeface="Shruti"/>
+        <a:font script="Khmr" typeface="MoolBoran"/>
+        <a:font script="Knda" typeface="Tunga"/>
+        <a:font script="Guru" typeface="Raavi"/>
+        <a:font script="Cans" typeface="Euphemia"/>
+        <a:font script="Cher" typeface="Plantagenet Cherokee"/>
+        <a:font script="Yiii" typeface="Microsoft Yi Baiti"/>
+        <a:font script="Tibt" typeface="Microsoft Himalaya"/>
+        <a:font script="Thaa" typeface="MV Boli"/>
+        <a:font script="Deva" typeface="Mangal"/>
+        <a:font script="Telu" typeface="Gautami"/>
+        <a:font script="Taml" typeface="Latha"/>
+        <a:font script="Syrc" typeface="Estrangelo Edessa"/>
+        <a:font script="Orya" typeface="Kalinga"/>
+        <a:font script="Mlym" typeface="Kartika"/>
+        <a:font script="Laoo" typeface="DokChampa"/>
+        <a:font script="Sinh" typeface="Iskoola Pota"/>
+        <a:font script="Mong" typeface="Mongolian Baiti"/>
+        <a:font script="Viet" typeface="Times New Roman"/>
+        <a:font script="Uigh" typeface="Microsoft Uighur"/>
+        <a:font script="Geor" typeface="Sylfaen"/>
+        <a:font script="Armn" typeface="Arial"/>
+        <a:font script="Bugi" typeface="Leelawadee UI"/>
+        <a:font script="Bopo" typeface="Microsoft JhengHei"/>
+        <a:font script="Java" typeface="Javanese Text"/>
+        <a:font script="Lisu" typeface="Segoe UI"/>
+        <a:font script="Mymr" typeface="Myanmar Text"/>
+        <a:font script="Nkoo" typeface="Ebrima"/>
+        <a:font script="Olck" typeface="Nirmala UI"/>
+        <a:font script="Osma" typeface="Ebrima"/>
+        <a:font script="Phag" typeface="Phagspa"/>
+        <a:font script="Syrn" typeface="Estrangelo Edessa"/>
+        <a:font script="Syrj" typeface="Estrangelo Edessa"/>
+        <a:font script="Syre" typeface="Estrangelo Edessa"/>
+        <a:font script="Sora" typeface="Nirmala UI"/>
+        <a:font script="Tale" typeface="Microsoft Tai Le"/>
+        <a:font script="Talu" typeface="Microsoft New Tai Lue"/>
+        <a:font script="Tfng" typeface="Ebrima"/>
+      </a:majorFont>
+      <a:minorFont>
+        <a:latin typeface="Calibri" panose="020F0502020204030204"/>
+        <a:ea typeface=""/>
+        <a:cs typeface=""/>
+        <a:font script="Jpan" typeface="游ゴシック"/>
+        <a:font script="Hang" typeface="맑은 고딕"/>
+        <a:font script="Hans" typeface="等线"/>
+        <a:font script="Hant" typeface="新細明體"/>
+        <a:font script="Arab" typeface="Arial"/>
+        <a:font script="Hebr" typeface="Arial"/>
+        <a:font script="Thai" typeface="Cordia New"/>
+        <a:font script="Ethi" typeface="Nyala"/>
+        <a:font script="Beng" typeface="Vrinda"/>
+        <a:font script="Gujr" typeface="Shruti"/>
+        <a:font script="Khmr" typeface="DaunPenh"/>
+        <a:font script="Knda" typeface="Tunga"/>
+        <a:font script="Guru" typeface="Raavi"/>
+        <a:font script="Cans" typeface="Euphemia"/>
+        <a:font script="Cher" typeface="Plantagenet Cherokee"/>
+        <a:font script="Yiii" typeface="Microsoft Yi Baiti"/>
+        <a:font script="Tibt" typeface="Microsoft Himalaya"/>
+        <a:font script="Thaa" typeface="MV Boli"/>
+        <a:font script="Deva" typeface="Mangal"/>
+        <a:font script="Telu" typeface="Gautami"/>
+        <a:font script="Taml" typeface="Latha"/>
+        <a:font script="Syrc" typeface="Estrangelo Edessa"/>
+        <a:font script="Orya" typeface="Kalinga"/>
+        <a:font script="Mlym" typeface="Kartika"/>
+        <a:font script="Laoo" typeface="DokChampa"/>
+        <a:font script="Sinh" typeface="Iskoola Pota"/>
+        <a:font script="Mong" typeface="Mongolian Baiti"/>
+        <a:font script="Viet" typeface="Arial"/>
+        <a:font script="Uigh" typeface="Microsoft Uighur"/>
+        <a:font script="Geor" typeface="Sylfaen"/>
+        <a:font script="Armn" typeface="Arial"/>
+        <a:font script="Bugi" typeface="Leelawadee UI"/>
+        <a:font script="Bopo" typeface="Microsoft JhengHei"/>
+        <a:font script="Java" typeface="Javanese Text"/>
+        <a:font script="Lisu" typeface="Segoe UI"/>
+        <a:font script="Mymr" typeface="Myanmar Text"/>
+        <a:font script="Nkoo" typeface="Ebrima"/>
+        <a:font script="Olck" typeface="Nirmala UI"/>
+        <a:font script="Osma" typeface="Ebrima"/>
+        <a:font script="Phag" typeface="Phagspa"/>
+        <a:font script="Syrn" typeface="Estrangelo Edessa"/>
+        <a:font script="Syrj" typeface="Estrangelo Edessa"/>
+        <a:font script="Syre" typeface="Estrangelo Edessa"/>
+        <a:font script="Sora" typeface="Nirmala UI"/>
+        <a:font script="Tale" typeface="Microsoft Tai Le"/>
+        <a:font script="Talu" typeface="Microsoft New Tai Lue"/>
+        <a:font script="Tfng" typeface="Ebrima"/>
+      </a:minorFont>
+    </a:fontScheme>
+    <a:fmtScheme name="Office">
+      <a:fillStyleLst>
+        <a:solidFill>
+          <a:schemeClr val="phClr"/>
+        </a:solidFill>
+        <a:gradFill rotWithShape="1">
+          <a:gsLst>
+            <a:gs pos="0">
+              <a:schemeClr val="phClr">
+                <a:lumMod val="110000"/>
+                <a:satMod val="105000"/>
+                <a:tint val="67000"/>
+              </a:schemeClr>
+            </a:gs>
+            <a:gs pos="50000">
+              <a:schemeClr val="phClr">
+                <a:lumMod val="105000"/>
+                <a:satMod val="103000"/>
+                <a:tint val="73000"/>
+              </a:schemeClr>
+            </a:gs>
+            <a:gs pos="100000">
+              <a:schemeClr val="phClr">
+                <a:lumMod val="105000"/>
+                <a:satMod val="109000"/>
+                <a:tint val="81000"/>
+              </a:schemeClr>
+            </a:gs>
+          </a:gsLst>
+          <a:lin ang="5400000" scaled="0"/>
+        </a:gradFill>
+        <a:gradFill rotWithShape="1">
+          <a:gsLst>
+            <a:gs pos="0">
+              <a:schemeClr val="phClr">
+                <a:satMod val="103000"/>
+                <a:lumMod val="102000"/>
+                <a:tint val="94000"/>
+              </a:schemeClr>
+            </a:gs>
+            <a:gs pos="50000">
+              <a:schemeClr val="phClr">
+                <a:satMod val="110000"/>
+                <a:lumMod val="100000"/>
+                <a:shade val="100000"/>
+              </a:schemeClr>
+            </a:gs>
+            <a:gs pos="100000">
+              <a:schemeClr val="phClr">
+                <a:lumMod val="99000"/>
+                <a:satMod val="120000"/>
+                <a:shade val="78000"/>
+              </a:schemeClr>
+            </a:gs>
+          </a:gsLst>
+          <a:lin ang="5400000" scaled="0"/>
+        </a:gradFill>
+      </a:fillStyleLst>
+      <a:lnStyleLst>
+        <a:ln w="6350" cap="flat" cmpd="sng" algn="ctr">
+          <a:solidFill>
+            <a:schemeClr val="phClr"/>
+          </a:solidFill>
+          <a:prstDash val="solid"/>
+          <a:miter lim="800000"/>
+        </a:ln>
+        <a:ln w="12700" cap="flat" cmpd="sng" algn="ctr">
+          <a:solidFill>
+            <a:schemeClr val="phClr"/>
+          </a:solidFill>
+          <a:prstDash val="solid"/>
+          <a:miter lim="800000"/>
+        </a:ln>
+        <a:ln w="19050" cap="flat" cmpd="sng" algn="ctr">
+          <a:solidFill>
+            <a:schemeClr val="phClr"/>
+          </a:solidFill>
+          <a:prstDash val="solid"/>
+          <a:miter lim="800000"/>
+        </a:ln>
+      </a:lnStyleLst>
+      <a:effectStyleLst>
+        <a:effectStyle>
+          <a:effectLst/>
+        </a:effectStyle>
+        <a:effectStyle>
+          <a:effectLst/>
+        </a:effectStyle>
+        <a:effectStyle>
+          <a:effectLst>
+            <a:outerShdw blurRad="57150" dist="19050" dir="5400000" algn="ctr" rotWithShape="0">
+              <a:srgbClr val="000000">
+                <a:alpha val="63000"/>
+              </a:srgbClr>
+            </a:outerShdw>
+          </a:effectLst>
+        </a:effectStyle>
+      </a:effectStyleLst>
+      <a:bgFillStyleLst>
+        <a:solidFill>
+          <a:schemeClr val="phClr"/>
+        </a:solidFill>
+        <a:solidFill>
+          <a:schemeClr val="phClr">
+            <a:tint val="95000"/>
+            <a:satMod val="170000"/>
+          </a:schemeClr>
+        </a:solidFill>
+        <a:gradFill rotWithShape="1">
+          <a:gsLst>
+            <a:gs pos="0">
+              <a:schemeClr val="phClr">
+                <a:tint val="93000"/>
+                <a:satMod val="150000"/>
+                <a:shade val="98000"/>
+                <a:lumMod val="102000"/>
+              </a:schemeClr>
+            </a:gs>
+            <a:gs pos="50000">
+              <a:schemeClr val="phClr">
+                <a:tint val="98000"/>
+                <a:satMod val="130000"/>
+                <a:shade val="90000"/>
+                <a:lumMod val="103000"/>
+              </a:schemeClr>
+            </a:gs>
+            <a:gs pos="100000">
+              <a:schemeClr val="phClr">
+                <a:shade val="63000"/>
+                <a:satMod val="120000"/>
+              </a:schemeClr>
+            </a:gs>
+          </a:gsLst>
+          <a:lin ang="5400000" scaled="0"/>
+        </a:gradFill>
+      </a:bgFillStyleLst>
+    </a:fmtScheme>
+  </a:themeElements>
+  <a:objectDefaults/>
+  <a:extraClrSchemeLst/>
+  <a:extLst>
+    <a:ext uri="{05A4C25C-085E-4340-85A3-A5531E510DB2}">
+      <thm15:themeFamily xmlns:thm15="http://schemas.microsoft.com/office/thememl/2012/main" name="Office Theme" id="{62F939B6-93AF-4DB8-9C6B-D6C7DFDC589F}" vid="{4A3C46E8-61CC-4603-A589-7422A47A8E4A}"/>
+    </a:ext>
+  </a:extLst>
+</a:theme>
 </file>
</xml_diff>

<commit_message>
Fix typos in hyperlinks
</commit_message>
<xml_diff>
--- a/Recursion.pptx
+++ b/Recursion.pptx
@@ -206,7 +206,7 @@
           <a:p>
             <a:fld id="{22E3DE2D-CFF6-4186-A485-014B1281820F}" type="datetimeFigureOut">
               <a:rPr lang="en-US" smtClean="0"/>
-              <a:t>8/22/2021</a:t>
+              <a:t>9/18/21</a:t>
             </a:fld>
             <a:endParaRPr lang="en-US" dirty="0"/>
           </a:p>
@@ -620,7 +620,7 @@
           <a:p>
             <a:fld id="{4E6BD2DE-AB0E-4EC4-9F44-3473AE8DD09C}" type="datetime1">
               <a:rPr lang="en-US" smtClean="0"/>
-              <a:t>8/22/2021</a:t>
+              <a:t>9/18/21</a:t>
             </a:fld>
             <a:endParaRPr lang="en-US" dirty="0"/>
           </a:p>
@@ -648,8 +648,12 @@
           <a:lstStyle/>
           <a:p>
             <a:r>
-              <a:rPr lang="en-US"/>
-              <a:t>https://github.com/avifarah/Recurson</a:t>
+              <a:rPr lang="en-US" dirty="0"/>
+              <a:t>https://github.com/avifarah/</a:t>
+            </a:r>
+            <a:r>
+              <a:rPr lang="en-US" dirty="0" err="1"/>
+              <a:t>Recurson</a:t>
             </a:r>
             <a:endParaRPr lang="en-US" dirty="0"/>
           </a:p>
@@ -822,7 +826,7 @@
           <a:p>
             <a:fld id="{397F5496-3091-4B5B-8DD5-67D3D7FC764D}" type="datetime1">
               <a:rPr lang="en-US" smtClean="0"/>
-              <a:t>8/22/2021</a:t>
+              <a:t>9/18/21</a:t>
             </a:fld>
             <a:endParaRPr lang="en-US" dirty="0"/>
           </a:p>
@@ -850,8 +854,12 @@
           <a:lstStyle/>
           <a:p>
             <a:r>
-              <a:rPr lang="en-US"/>
-              <a:t>https://github.com/avifarah/Recurson</a:t>
+              <a:rPr lang="en-US" dirty="0"/>
+              <a:t>https://github.com/avifarah/</a:t>
+            </a:r>
+            <a:r>
+              <a:rPr lang="en-US" dirty="0" err="1"/>
+              <a:t>Recurson</a:t>
             </a:r>
             <a:endParaRPr lang="en-US" dirty="0"/>
           </a:p>
@@ -1034,7 +1042,7 @@
           <a:p>
             <a:fld id="{FA91CA60-89FB-47AC-9004-0795A1301801}" type="datetime1">
               <a:rPr lang="en-US" smtClean="0"/>
-              <a:t>8/22/2021</a:t>
+              <a:t>9/18/21</a:t>
             </a:fld>
             <a:endParaRPr lang="en-US" dirty="0"/>
           </a:p>
@@ -1062,8 +1070,12 @@
           <a:lstStyle/>
           <a:p>
             <a:r>
-              <a:rPr lang="en-US"/>
-              <a:t>https://github.com/avifarah/Recurson</a:t>
+              <a:rPr lang="en-US" dirty="0"/>
+              <a:t>https://github.com/avifarah/</a:t>
+            </a:r>
+            <a:r>
+              <a:rPr lang="en-US" dirty="0" err="1"/>
+              <a:t>Recurson</a:t>
             </a:r>
             <a:endParaRPr lang="en-US" dirty="0"/>
           </a:p>
@@ -1236,7 +1248,7 @@
           <a:p>
             <a:fld id="{CAFCFD8F-DC83-4F6F-9F64-A05441656A74}" type="datetime1">
               <a:rPr lang="en-US" smtClean="0"/>
-              <a:t>8/22/2021</a:t>
+              <a:t>9/18/21</a:t>
             </a:fld>
             <a:endParaRPr lang="en-US" dirty="0"/>
           </a:p>
@@ -1264,8 +1276,12 @@
           <a:lstStyle/>
           <a:p>
             <a:r>
-              <a:rPr lang="en-US"/>
-              <a:t>https://github.com/avifarah/Recurson</a:t>
+              <a:rPr lang="en-US" dirty="0"/>
+              <a:t>https://github.com/avifarah/</a:t>
+            </a:r>
+            <a:r>
+              <a:rPr lang="en-US" dirty="0" err="1"/>
+              <a:t>Recurson</a:t>
             </a:r>
             <a:endParaRPr lang="en-US" dirty="0"/>
           </a:p>
@@ -1515,7 +1531,7 @@
           <a:p>
             <a:fld id="{8938B9D1-8B1B-433F-A4CB-461281CA8ADE}" type="datetime1">
               <a:rPr lang="en-US" smtClean="0"/>
-              <a:t>8/22/2021</a:t>
+              <a:t>9/18/21</a:t>
             </a:fld>
             <a:endParaRPr lang="en-US" dirty="0"/>
           </a:p>
@@ -1543,8 +1559,12 @@
           <a:lstStyle/>
           <a:p>
             <a:r>
-              <a:rPr lang="en-US"/>
-              <a:t>https://github.com/avifarah/Recurson</a:t>
+              <a:rPr lang="en-US" dirty="0"/>
+              <a:t>https://github.com/avifarah/</a:t>
+            </a:r>
+            <a:r>
+              <a:rPr lang="en-US" dirty="0" err="1"/>
+              <a:t>Recurson</a:t>
             </a:r>
             <a:endParaRPr lang="en-US" dirty="0"/>
           </a:p>
@@ -1784,7 +1804,7 @@
           <a:p>
             <a:fld id="{04EC4C3F-A240-4441-9F04-A682CB663ED3}" type="datetime1">
               <a:rPr lang="en-US" smtClean="0"/>
-              <a:t>8/22/2021</a:t>
+              <a:t>9/18/21</a:t>
             </a:fld>
             <a:endParaRPr lang="en-US" dirty="0"/>
           </a:p>
@@ -1812,8 +1832,12 @@
           <a:lstStyle/>
           <a:p>
             <a:r>
-              <a:rPr lang="en-US"/>
-              <a:t>https://github.com/avifarah/Recurson</a:t>
+              <a:rPr lang="en-US" dirty="0"/>
+              <a:t>https://github.com/avifarah/</a:t>
+            </a:r>
+            <a:r>
+              <a:rPr lang="en-US" dirty="0" err="1"/>
+              <a:t>Recurson</a:t>
             </a:r>
             <a:endParaRPr lang="en-US" dirty="0"/>
           </a:p>
@@ -2200,7 +2224,7 @@
           <a:p>
             <a:fld id="{57016B8D-88DF-470A-99E2-2CDC3315A2BC}" type="datetime1">
               <a:rPr lang="en-US" smtClean="0"/>
-              <a:t>8/22/2021</a:t>
+              <a:t>9/18/21</a:t>
             </a:fld>
             <a:endParaRPr lang="en-US" dirty="0"/>
           </a:p>
@@ -2228,8 +2252,12 @@
           <a:lstStyle/>
           <a:p>
             <a:r>
-              <a:rPr lang="en-US"/>
-              <a:t>https://github.com/avifarah/Recurson</a:t>
+              <a:rPr lang="en-US" dirty="0"/>
+              <a:t>https://github.com/avifarah/</a:t>
+            </a:r>
+            <a:r>
+              <a:rPr lang="en-US" dirty="0" err="1"/>
+              <a:t>Recurson</a:t>
             </a:r>
             <a:endParaRPr lang="en-US" dirty="0"/>
           </a:p>
@@ -2345,7 +2373,7 @@
           <a:p>
             <a:fld id="{B9148364-5DBA-4CE0-807E-4D3E48CA6791}" type="datetime1">
               <a:rPr lang="en-US" smtClean="0"/>
-              <a:t>8/22/2021</a:t>
+              <a:t>9/18/21</a:t>
             </a:fld>
             <a:endParaRPr lang="en-US" dirty="0"/>
           </a:p>
@@ -2373,8 +2401,12 @@
           <a:lstStyle/>
           <a:p>
             <a:r>
-              <a:rPr lang="en-US"/>
-              <a:t>https://github.com/avifarah/Recurson</a:t>
+              <a:rPr lang="en-US" dirty="0"/>
+              <a:t>https://github.com/avifarah/</a:t>
+            </a:r>
+            <a:r>
+              <a:rPr lang="en-US" dirty="0" err="1"/>
+              <a:t>Recurson</a:t>
             </a:r>
             <a:endParaRPr lang="en-US" dirty="0"/>
           </a:p>
@@ -2462,7 +2494,7 @@
           <a:p>
             <a:fld id="{69C85018-EED3-4584-AF03-6EC1E37102B5}" type="datetime1">
               <a:rPr lang="en-US" smtClean="0"/>
-              <a:t>8/22/2021</a:t>
+              <a:t>9/18/21</a:t>
             </a:fld>
             <a:endParaRPr lang="en-US" dirty="0"/>
           </a:p>
@@ -2490,8 +2522,12 @@
           <a:lstStyle/>
           <a:p>
             <a:r>
-              <a:rPr lang="en-US"/>
-              <a:t>https://github.com/avifarah/Recurson</a:t>
+              <a:rPr lang="en-US" dirty="0"/>
+              <a:t>https://github.com/avifarah/</a:t>
+            </a:r>
+            <a:r>
+              <a:rPr lang="en-US" dirty="0" err="1"/>
+              <a:t>Recurson</a:t>
             </a:r>
             <a:endParaRPr lang="en-US" dirty="0"/>
           </a:p>
@@ -2777,7 +2813,7 @@
           <a:p>
             <a:fld id="{E557030F-424A-461D-BAD3-793DB96A4027}" type="datetime1">
               <a:rPr lang="en-US" smtClean="0"/>
-              <a:t>8/22/2021</a:t>
+              <a:t>9/18/21</a:t>
             </a:fld>
             <a:endParaRPr lang="en-US" dirty="0"/>
           </a:p>
@@ -2805,8 +2841,12 @@
           <a:lstStyle/>
           <a:p>
             <a:r>
-              <a:rPr lang="en-US"/>
-              <a:t>https://github.com/avifarah/Recurson</a:t>
+              <a:rPr lang="en-US" dirty="0"/>
+              <a:t>https://github.com/avifarah/</a:t>
+            </a:r>
+            <a:r>
+              <a:rPr lang="en-US" dirty="0" err="1"/>
+              <a:t>Recurson</a:t>
             </a:r>
             <a:endParaRPr lang="en-US" dirty="0"/>
           </a:p>
@@ -3069,7 +3109,7 @@
           <a:p>
             <a:fld id="{9D1081C4-BBEF-47D9-B2C5-34ACDE947E83}" type="datetime1">
               <a:rPr lang="en-US" smtClean="0"/>
-              <a:t>8/22/2021</a:t>
+              <a:t>9/18/21</a:t>
             </a:fld>
             <a:endParaRPr lang="en-US" dirty="0"/>
           </a:p>
@@ -3097,8 +3137,12 @@
           <a:lstStyle/>
           <a:p>
             <a:r>
-              <a:rPr lang="en-US"/>
-              <a:t>https://github.com/avifarah/Recurson</a:t>
+              <a:rPr lang="en-US" dirty="0"/>
+              <a:t>https://github.com/avifarah/</a:t>
+            </a:r>
+            <a:r>
+              <a:rPr lang="en-US" dirty="0" err="1"/>
+              <a:t>Recurson</a:t>
             </a:r>
             <a:endParaRPr lang="en-US" dirty="0"/>
           </a:p>
@@ -3314,7 +3358,7 @@
           <a:p>
             <a:fld id="{C54ECCEC-1148-47FD-85D3-B4FBD873B9E1}" type="datetime1">
               <a:rPr lang="en-US" smtClean="0"/>
-              <a:t>8/22/2021</a:t>
+              <a:t>9/18/21</a:t>
             </a:fld>
             <a:endParaRPr lang="en-US" dirty="0"/>
           </a:p>
@@ -3360,8 +3404,12 @@
           </a:lstStyle>
           <a:p>
             <a:r>
-              <a:rPr lang="en-US"/>
-              <a:t>https://github.com/avifarah/Recurson</a:t>
+              <a:rPr lang="en-US" dirty="0"/>
+              <a:t>https://github.com/avifarah/</a:t>
+            </a:r>
+            <a:r>
+              <a:rPr lang="en-US" dirty="0" err="1"/>
+              <a:t>Recurson</a:t>
             </a:r>
             <a:endParaRPr lang="en-US" dirty="0"/>
           </a:p>
@@ -3853,10 +3901,9 @@
           <a:lstStyle/>
           <a:p>
             <a:r>
-              <a:rPr lang="en-US"/>
-              <a:t>https://github.com/avifarah/Recurson</a:t>
-            </a:r>
-            <a:endParaRPr lang="en-US" dirty="0"/>
+              <a:rPr lang="en-US" dirty="0"/>
+              <a:t>https://github.com/avifarah/Recursion</a:t>
+            </a:r>
           </a:p>
         </p:txBody>
       </p:sp>
@@ -4865,10 +4912,9 @@
           <a:lstStyle/>
           <a:p>
             <a:r>
-              <a:rPr lang="en-US"/>
-              <a:t>https://github.com/avifarah/Recurson</a:t>
-            </a:r>
-            <a:endParaRPr lang="en-US" dirty="0"/>
+              <a:rPr lang="en-US" dirty="0"/>
+              <a:t>https://github.com/avifarah/Recursion</a:t>
+            </a:r>
           </a:p>
         </p:txBody>
       </p:sp>
@@ -4999,7 +5045,7 @@
               <a:rPr lang="en-US" sz="2600" dirty="0">
                 <a:latin typeface="Consolas" panose="020B0609020204030204" pitchFamily="49" charset="0"/>
               </a:rPr>
-              <a:t> Recursion: What, Why and How</a:t>
+              <a:t> Recursion: What, Why, and How</a:t>
             </a:r>
           </a:p>
           <a:p>
@@ -5011,7 +5057,7 @@
               <a:rPr lang="en-US" sz="2600" dirty="0">
                 <a:latin typeface="Consolas" panose="020B0609020204030204" pitchFamily="49" charset="0"/>
               </a:rPr>
-              <a:t> Tail recursion vs Left recursion</a:t>
+              <a:t> Tail recursion vs. Left recursion</a:t>
             </a:r>
           </a:p>
           <a:p>
@@ -5060,7 +5106,7 @@
                 <a:latin typeface="Consolas" panose="020B0609020204030204" pitchFamily="49" charset="0"/>
                 <a:hlinkClick r:id="rId2"/>
               </a:rPr>
-              <a:t>https://github.com/avifarah/Recurson</a:t>
+              <a:t>https://github.com/avifarah/Recursion</a:t>
             </a:r>
             <a:endParaRPr lang="en-US" sz="2400" b="0" dirty="0">
               <a:effectLst/>
@@ -5085,7 +5131,7 @@
                 <a:latin typeface="Consolas" panose="020B0609020204030204" pitchFamily="49" charset="0"/>
                 <a:hlinkClick r:id="rId3"/>
               </a:rPr>
-              <a:t>https://github.com/avifarah/Recurson.Recursion1</a:t>
+              <a:t>https://github.com/avifarah/Recursion.Recursion1</a:t>
             </a:r>
             <a:endParaRPr lang="en-US" sz="2400" b="0" dirty="0">
               <a:effectLst/>
@@ -5110,7 +5156,7 @@
                 <a:latin typeface="Consolas" panose="020B0609020204030204" pitchFamily="49" charset="0"/>
                 <a:hlinkClick r:id="rId4"/>
               </a:rPr>
-              <a:t>https://github.com/avifarah/Recurson.Recursion-Stripped</a:t>
+              <a:t>https://github.com/avifarah/Recursion.Recursion-Stripped</a:t>
             </a:r>
             <a:endParaRPr lang="en-US" sz="2400" b="0" dirty="0">
               <a:effectLst/>
@@ -5135,7 +5181,7 @@
                 <a:latin typeface="Consolas" panose="020B0609020204030204" pitchFamily="49" charset="0"/>
                 <a:hlinkClick r:id="rId5"/>
               </a:rPr>
-              <a:t>https://github.com/avifarah/Recurson.TreeProcessing</a:t>
+              <a:t>https://github.com/avifarah/Recursion.TreeProcessing</a:t>
             </a:r>
             <a:endParaRPr lang="en-US" sz="2400" b="0" dirty="0">
               <a:effectLst/>
@@ -5160,7 +5206,7 @@
                 <a:latin typeface="Consolas" panose="020B0609020204030204" pitchFamily="49" charset="0"/>
                 <a:hlinkClick r:id="rId6"/>
               </a:rPr>
-              <a:t>https://github.com/avifarah/Recurson.TreeProcessing-Stripped</a:t>
+              <a:t>https://github.com/avifarah/Recursion.TreeProcessing-Stripped</a:t>
             </a:r>
             <a:endParaRPr lang="en-US" sz="2400" b="0" dirty="0">
               <a:effectLst/>
@@ -5191,10 +5237,9 @@
           <a:lstStyle/>
           <a:p>
             <a:r>
-              <a:rPr lang="en-US"/>
-              <a:t>https://github.com/avifarah/Recurson</a:t>
-            </a:r>
-            <a:endParaRPr lang="en-US" dirty="0"/>
+              <a:rPr lang="en-US" dirty="0"/>
+              <a:t>https://github.com/avifarah/Recursion</a:t>
+            </a:r>
           </a:p>
         </p:txBody>
       </p:sp>
@@ -5982,7 +6027,41 @@
             </a:r>
             <a:r>
               <a:rPr lang="en-US" dirty="0"/>
-              <a:t>—Same logic applied to n items is applied to n – 1 items</a:t>
+              <a:t>—Same logic applied to </a:t>
+            </a:r>
+            <a:r>
+              <a:rPr lang="en-US" dirty="0">
+                <a:solidFill>
+                  <a:srgbClr val="0070C0"/>
+                </a:solidFill>
+                <a:latin typeface="Consolas" panose="020B0609020204030204" pitchFamily="49" charset="0"/>
+                <a:cs typeface="Consolas" panose="020B0609020204030204" pitchFamily="49" charset="0"/>
+              </a:rPr>
+              <a:t>n</a:t>
+            </a:r>
+            <a:r>
+              <a:rPr lang="en-US" dirty="0"/>
+              <a:t> items is applied to </a:t>
+            </a:r>
+            <a:r>
+              <a:rPr lang="en-US" dirty="0">
+                <a:solidFill>
+                  <a:srgbClr val="0070C0"/>
+                </a:solidFill>
+                <a:latin typeface="Consolas" panose="020B0609020204030204" pitchFamily="49" charset="0"/>
+                <a:cs typeface="Consolas" panose="020B0609020204030204" pitchFamily="49" charset="0"/>
+              </a:rPr>
+              <a:t>n – 1</a:t>
+            </a:r>
+            <a:r>
+              <a:rPr lang="en-US" dirty="0">
+                <a:cs typeface="Consolas" panose="020B0609020204030204" pitchFamily="49" charset="0"/>
+              </a:rPr>
+              <a:t> </a:t>
+            </a:r>
+            <a:r>
+              <a:rPr lang="en-US" dirty="0"/>
+              <a:t>items</a:t>
             </a:r>
           </a:p>
           <a:p>
@@ -6189,7 +6268,21 @@
           <a:p>
             <a:r>
               <a:rPr lang="en-US" dirty="0"/>
-              <a:t>The above Factorial(..) will </a:t>
+              <a:t>The above </a:t>
+            </a:r>
+            <a:r>
+              <a:rPr lang="en-US" dirty="0">
+                <a:solidFill>
+                  <a:srgbClr val="0070C0"/>
+                </a:solidFill>
+                <a:latin typeface="Consolas" panose="020B0609020204030204" pitchFamily="49" charset="0"/>
+                <a:cs typeface="Consolas" panose="020B0609020204030204" pitchFamily="49" charset="0"/>
+              </a:rPr>
+              <a:t>Factorial(..)</a:t>
+            </a:r>
+            <a:r>
+              <a:rPr lang="en-US" dirty="0"/>
+              <a:t> will </a:t>
             </a:r>
             <a:r>
               <a:rPr lang="en-US" b="1" dirty="0"/>
@@ -6202,7 +6295,7 @@
             <a:r>
               <a:rPr lang="en-US" sz="2400" dirty="0">
                 <a:solidFill>
-                  <a:srgbClr val="002060"/>
+                  <a:srgbClr val="0070C0"/>
                 </a:solidFill>
                 <a:latin typeface="Consolas" panose="020B0609020204030204" pitchFamily="49" charset="0"/>
               </a:rPr>
@@ -6233,10 +6326,9 @@
           <a:lstStyle/>
           <a:p>
             <a:r>
-              <a:rPr lang="en-US"/>
-              <a:t>https://github.com/avifarah/Recurson</a:t>
-            </a:r>
-            <a:endParaRPr lang="en-US" dirty="0"/>
+              <a:rPr lang="en-US" dirty="0"/>
+              <a:t>https://github.com/avifarah/Recursion</a:t>
+            </a:r>
           </a:p>
         </p:txBody>
       </p:sp>
@@ -7062,10 +7154,9 @@
           <a:lstStyle/>
           <a:p>
             <a:r>
-              <a:rPr lang="en-US"/>
-              <a:t>https://github.com/avifarah/Recurson</a:t>
-            </a:r>
-            <a:endParaRPr lang="en-US" dirty="0"/>
+              <a:rPr lang="en-US" dirty="0"/>
+              <a:t>https://github.com/avifarah/Recursion</a:t>
+            </a:r>
           </a:p>
         </p:txBody>
       </p:sp>
@@ -7181,7 +7272,7 @@
           <a:p>
             <a:r>
               <a:rPr lang="en-US" dirty="0"/>
-              <a:t>To implement recursion compilers use a stack, the same stack that is used to control the flow of function/method calls.</a:t>
+              <a:t>To implement recursion, compilers use a stack—the same stack that is used to control the flow of function/method calls.</a:t>
             </a:r>
           </a:p>
           <a:p>
@@ -7207,7 +7298,7 @@
             </a:pPr>
             <a:r>
               <a:rPr lang="en-US" dirty="0"/>
-              <a:t> Upon return: top frame is popped and hydrate local variables.</a:t>
+              <a:t> Upon return: top frame is popped and hydrate local variables</a:t>
             </a:r>
           </a:p>
           <a:p>
@@ -7220,7 +7311,7 @@
                   <a:srgbClr val="0070C0"/>
                 </a:solidFill>
               </a:rPr>
-              <a:t>A recursive solution is therefore more expensive then its iterative counterpart.  </a:t>
+              <a:t>A recursive solution is therefore more expensive than its iterative counterpart. </a:t>
             </a:r>
             <a:r>
               <a:rPr lang="en-US" b="1" i="1" u="sng" dirty="0">
@@ -7268,10 +7359,9 @@
           <a:lstStyle/>
           <a:p>
             <a:r>
-              <a:rPr lang="en-US"/>
-              <a:t>https://github.com/avifarah/Recurson</a:t>
-            </a:r>
-            <a:endParaRPr lang="en-US" dirty="0"/>
+              <a:rPr lang="en-US" dirty="0"/>
+              <a:t>https://github.com/avifarah/Recursion</a:t>
+            </a:r>
           </a:p>
         </p:txBody>
       </p:sp>
@@ -7983,10 +8073,9 @@
           <a:lstStyle/>
           <a:p>
             <a:r>
-              <a:rPr lang="en-US"/>
-              <a:t>https://github.com/avifarah/Recurson</a:t>
-            </a:r>
-            <a:endParaRPr lang="en-US" dirty="0"/>
+              <a:rPr lang="en-US" dirty="0"/>
+              <a:t>https://github.com/avifarah/Recursion</a:t>
+            </a:r>
           </a:p>
         </p:txBody>
       </p:sp>
@@ -8308,10 +8397,9 @@
           <a:lstStyle/>
           <a:p>
             <a:r>
-              <a:rPr lang="en-US"/>
-              <a:t>https://github.com/avifarah/Recurson</a:t>
-            </a:r>
-            <a:endParaRPr lang="en-US" dirty="0"/>
+              <a:rPr lang="en-US" dirty="0"/>
+              <a:t>https://github.com/avifarah/Recursion</a:t>
+            </a:r>
           </a:p>
         </p:txBody>
       </p:sp>
@@ -8880,7 +8968,7 @@
             </a:r>
             <a:r>
               <a:rPr lang="en-US" dirty="0"/>
-              <a:t> processing then the tree structure given above is not the best data-structure.  For example: </a:t>
+              <a:t> processing, then the tree structure given above is not the best data structure.  For example: </a:t>
             </a:r>
             <a:r>
               <a:rPr lang="en-US" sz="2600" dirty="0">
@@ -8967,10 +9055,9 @@
           <a:lstStyle/>
           <a:p>
             <a:r>
-              <a:rPr lang="en-US"/>
-              <a:t>https://github.com/avifarah/Recurson</a:t>
-            </a:r>
-            <a:endParaRPr lang="en-US" dirty="0"/>
+              <a:rPr lang="en-US" dirty="0"/>
+              <a:t>https://github.com/avifarah/Recursion</a:t>
+            </a:r>
           </a:p>
         </p:txBody>
       </p:sp>
@@ -9061,8 +9148,8 @@
           </a:p>
         </p:txBody>
       </p:sp>
-      <mc:AlternateContent xmlns:mc="http://schemas.openxmlformats.org/markup-compatibility/2006" xmlns:a14="http://schemas.microsoft.com/office/drawing/2010/main">
-        <mc:Choice Requires="a14">
+      <mc:AlternateContent xmlns:mc="http://schemas.openxmlformats.org/markup-compatibility/2006">
+        <mc:Choice xmlns:a14="http://schemas.microsoft.com/office/drawing/2010/main" Requires="a14">
           <p:sp>
             <p:nvSpPr>
               <p:cNvPr id="3" name="Content Placeholder 2">
@@ -9087,7 +9174,7 @@
             </p:spPr>
             <p:txBody>
               <a:bodyPr>
-                <a:normAutofit fontScale="92500" lnSpcReduction="20000"/>
+                <a:normAutofit fontScale="92500" lnSpcReduction="10000"/>
               </a:bodyPr>
               <a:lstStyle/>
               <a:p>
@@ -9099,13 +9186,15 @@
               <a:p>
                 <a:r>
                   <a:rPr lang="en-US" dirty="0"/>
-                  <a:t>Then we show that If our observation is true for the n’th case</a:t>
+                  <a:t>Then we show that if our observation is true for the nth case, our observed pattern holds for the (n + 1)</a:t>
                 </a:r>
-              </a:p>
-              <a:p>
+                <a:r>
+                  <a:rPr lang="en-US" dirty="0" err="1"/>
+                  <a:t>st</a:t>
+                </a:r>
                 <a:r>
                   <a:rPr lang="en-US" dirty="0"/>
-                  <a:t>Then our observed pattern holds for the (n + 1)’st case.</a:t>
+                  <a:t> case</a:t>
                 </a:r>
               </a:p>
               <a:p>
@@ -10079,7 +10168,7 @@
             </p:txBody>
           </p:sp>
         </mc:Choice>
-        <mc:Fallback xmlns="">
+        <mc:Fallback>
           <p:sp>
             <p:nvSpPr>
               <p:cNvPr id="3" name="Content Placeholder 2">
@@ -10104,7 +10193,7 @@
               <a:blipFill>
                 <a:blip r:embed="rId2"/>
                 <a:stretch>
-                  <a:fillRect l="-951" t="-3501" r="-503"/>
+                  <a:fillRect l="-7907" t="-2616" r="-465" b="-36337"/>
                 </a:stretch>
               </a:blipFill>
             </p:spPr>
@@ -10145,10 +10234,9 @@
           <a:lstStyle/>
           <a:p>
             <a:r>
-              <a:rPr lang="en-US"/>
-              <a:t>https://github.com/avifarah/Recurson</a:t>
-            </a:r>
-            <a:endParaRPr lang="en-US" dirty="0"/>
+              <a:rPr lang="en-US" dirty="0"/>
+              <a:t>https://github.com/avifarah/Recursion</a:t>
+            </a:r>
           </a:p>
         </p:txBody>
       </p:sp>

</xml_diff>

<commit_message>
shrink the arrows a bit
</commit_message>
<xml_diff>
--- a/Recursion.pptx
+++ b/Recursion.pptx
@@ -206,7 +206,7 @@
           <a:p>
             <a:fld id="{22E3DE2D-CFF6-4186-A485-014B1281820F}" type="datetimeFigureOut">
               <a:rPr lang="en-US" smtClean="0"/>
-              <a:t>10/4/2021</a:t>
+              <a:t>10/5/2021</a:t>
             </a:fld>
             <a:endParaRPr lang="en-US" dirty="0"/>
           </a:p>
@@ -620,7 +620,7 @@
           <a:p>
             <a:fld id="{4E6BD2DE-AB0E-4EC4-9F44-3473AE8DD09C}" type="datetime1">
               <a:rPr lang="en-US" smtClean="0"/>
-              <a:t>10/4/2021</a:t>
+              <a:t>10/5/2021</a:t>
             </a:fld>
             <a:endParaRPr lang="en-US" dirty="0"/>
           </a:p>
@@ -648,10 +648,9 @@
           <a:lstStyle/>
           <a:p>
             <a:r>
-              <a:rPr lang="en-US"/>
+              <a:rPr lang="en-US" dirty="0"/>
               <a:t>https://github.com/avifarah/Recurson</a:t>
             </a:r>
-            <a:endParaRPr lang="en-US" dirty="0"/>
           </a:p>
         </p:txBody>
       </p:sp>
@@ -822,7 +821,7 @@
           <a:p>
             <a:fld id="{397F5496-3091-4B5B-8DD5-67D3D7FC764D}" type="datetime1">
               <a:rPr lang="en-US" smtClean="0"/>
-              <a:t>10/4/2021</a:t>
+              <a:t>10/5/2021</a:t>
             </a:fld>
             <a:endParaRPr lang="en-US" dirty="0"/>
           </a:p>
@@ -850,10 +849,9 @@
           <a:lstStyle/>
           <a:p>
             <a:r>
-              <a:rPr lang="en-US"/>
+              <a:rPr lang="en-US" dirty="0"/>
               <a:t>https://github.com/avifarah/Recurson</a:t>
             </a:r>
-            <a:endParaRPr lang="en-US" dirty="0"/>
           </a:p>
         </p:txBody>
       </p:sp>
@@ -1034,7 +1032,7 @@
           <a:p>
             <a:fld id="{FA91CA60-89FB-47AC-9004-0795A1301801}" type="datetime1">
               <a:rPr lang="en-US" smtClean="0"/>
-              <a:t>10/4/2021</a:t>
+              <a:t>10/5/2021</a:t>
             </a:fld>
             <a:endParaRPr lang="en-US" dirty="0"/>
           </a:p>
@@ -1062,10 +1060,9 @@
           <a:lstStyle/>
           <a:p>
             <a:r>
-              <a:rPr lang="en-US"/>
+              <a:rPr lang="en-US" dirty="0"/>
               <a:t>https://github.com/avifarah/Recurson</a:t>
             </a:r>
-            <a:endParaRPr lang="en-US" dirty="0"/>
           </a:p>
         </p:txBody>
       </p:sp>
@@ -1236,7 +1233,7 @@
           <a:p>
             <a:fld id="{CAFCFD8F-DC83-4F6F-9F64-A05441656A74}" type="datetime1">
               <a:rPr lang="en-US" smtClean="0"/>
-              <a:t>10/4/2021</a:t>
+              <a:t>10/5/2021</a:t>
             </a:fld>
             <a:endParaRPr lang="en-US" dirty="0"/>
           </a:p>
@@ -1264,10 +1261,9 @@
           <a:lstStyle/>
           <a:p>
             <a:r>
-              <a:rPr lang="en-US"/>
+              <a:rPr lang="en-US" dirty="0"/>
               <a:t>https://github.com/avifarah/Recurson</a:t>
             </a:r>
-            <a:endParaRPr lang="en-US" dirty="0"/>
           </a:p>
         </p:txBody>
       </p:sp>
@@ -1515,7 +1511,7 @@
           <a:p>
             <a:fld id="{8938B9D1-8B1B-433F-A4CB-461281CA8ADE}" type="datetime1">
               <a:rPr lang="en-US" smtClean="0"/>
-              <a:t>10/4/2021</a:t>
+              <a:t>10/5/2021</a:t>
             </a:fld>
             <a:endParaRPr lang="en-US" dirty="0"/>
           </a:p>
@@ -1543,10 +1539,9 @@
           <a:lstStyle/>
           <a:p>
             <a:r>
-              <a:rPr lang="en-US"/>
+              <a:rPr lang="en-US" dirty="0"/>
               <a:t>https://github.com/avifarah/Recurson</a:t>
             </a:r>
-            <a:endParaRPr lang="en-US" dirty="0"/>
           </a:p>
         </p:txBody>
       </p:sp>
@@ -1784,7 +1779,7 @@
           <a:p>
             <a:fld id="{04EC4C3F-A240-4441-9F04-A682CB663ED3}" type="datetime1">
               <a:rPr lang="en-US" smtClean="0"/>
-              <a:t>10/4/2021</a:t>
+              <a:t>10/5/2021</a:t>
             </a:fld>
             <a:endParaRPr lang="en-US" dirty="0"/>
           </a:p>
@@ -1812,10 +1807,9 @@
           <a:lstStyle/>
           <a:p>
             <a:r>
-              <a:rPr lang="en-US"/>
+              <a:rPr lang="en-US" dirty="0"/>
               <a:t>https://github.com/avifarah/Recurson</a:t>
             </a:r>
-            <a:endParaRPr lang="en-US" dirty="0"/>
           </a:p>
         </p:txBody>
       </p:sp>
@@ -2200,7 +2194,7 @@
           <a:p>
             <a:fld id="{57016B8D-88DF-470A-99E2-2CDC3315A2BC}" type="datetime1">
               <a:rPr lang="en-US" smtClean="0"/>
-              <a:t>10/4/2021</a:t>
+              <a:t>10/5/2021</a:t>
             </a:fld>
             <a:endParaRPr lang="en-US" dirty="0"/>
           </a:p>
@@ -2228,10 +2222,9 @@
           <a:lstStyle/>
           <a:p>
             <a:r>
-              <a:rPr lang="en-US"/>
+              <a:rPr lang="en-US" dirty="0"/>
               <a:t>https://github.com/avifarah/Recurson</a:t>
             </a:r>
-            <a:endParaRPr lang="en-US" dirty="0"/>
           </a:p>
         </p:txBody>
       </p:sp>
@@ -2345,7 +2338,7 @@
           <a:p>
             <a:fld id="{B9148364-5DBA-4CE0-807E-4D3E48CA6791}" type="datetime1">
               <a:rPr lang="en-US" smtClean="0"/>
-              <a:t>10/4/2021</a:t>
+              <a:t>10/5/2021</a:t>
             </a:fld>
             <a:endParaRPr lang="en-US" dirty="0"/>
           </a:p>
@@ -2373,10 +2366,9 @@
           <a:lstStyle/>
           <a:p>
             <a:r>
-              <a:rPr lang="en-US"/>
+              <a:rPr lang="en-US" dirty="0"/>
               <a:t>https://github.com/avifarah/Recurson</a:t>
             </a:r>
-            <a:endParaRPr lang="en-US" dirty="0"/>
           </a:p>
         </p:txBody>
       </p:sp>
@@ -2462,7 +2454,7 @@
           <a:p>
             <a:fld id="{69C85018-EED3-4584-AF03-6EC1E37102B5}" type="datetime1">
               <a:rPr lang="en-US" smtClean="0"/>
-              <a:t>10/4/2021</a:t>
+              <a:t>10/5/2021</a:t>
             </a:fld>
             <a:endParaRPr lang="en-US" dirty="0"/>
           </a:p>
@@ -2490,10 +2482,9 @@
           <a:lstStyle/>
           <a:p>
             <a:r>
-              <a:rPr lang="en-US"/>
+              <a:rPr lang="en-US" dirty="0"/>
               <a:t>https://github.com/avifarah/Recurson</a:t>
             </a:r>
-            <a:endParaRPr lang="en-US" dirty="0"/>
           </a:p>
         </p:txBody>
       </p:sp>
@@ -2777,7 +2768,7 @@
           <a:p>
             <a:fld id="{E557030F-424A-461D-BAD3-793DB96A4027}" type="datetime1">
               <a:rPr lang="en-US" smtClean="0"/>
-              <a:t>10/4/2021</a:t>
+              <a:t>10/5/2021</a:t>
             </a:fld>
             <a:endParaRPr lang="en-US" dirty="0"/>
           </a:p>
@@ -2805,10 +2796,9 @@
           <a:lstStyle/>
           <a:p>
             <a:r>
-              <a:rPr lang="en-US"/>
+              <a:rPr lang="en-US" dirty="0"/>
               <a:t>https://github.com/avifarah/Recurson</a:t>
             </a:r>
-            <a:endParaRPr lang="en-US" dirty="0"/>
           </a:p>
         </p:txBody>
       </p:sp>
@@ -3069,7 +3059,7 @@
           <a:p>
             <a:fld id="{9D1081C4-BBEF-47D9-B2C5-34ACDE947E83}" type="datetime1">
               <a:rPr lang="en-US" smtClean="0"/>
-              <a:t>10/4/2021</a:t>
+              <a:t>10/5/2021</a:t>
             </a:fld>
             <a:endParaRPr lang="en-US" dirty="0"/>
           </a:p>
@@ -3097,10 +3087,9 @@
           <a:lstStyle/>
           <a:p>
             <a:r>
-              <a:rPr lang="en-US"/>
+              <a:rPr lang="en-US" dirty="0"/>
               <a:t>https://github.com/avifarah/Recurson</a:t>
             </a:r>
-            <a:endParaRPr lang="en-US" dirty="0"/>
           </a:p>
         </p:txBody>
       </p:sp>
@@ -3314,7 +3303,7 @@
           <a:p>
             <a:fld id="{C54ECCEC-1148-47FD-85D3-B4FBD873B9E1}" type="datetime1">
               <a:rPr lang="en-US" smtClean="0"/>
-              <a:t>10/4/2021</a:t>
+              <a:t>10/5/2021</a:t>
             </a:fld>
             <a:endParaRPr lang="en-US" dirty="0"/>
           </a:p>
@@ -3360,10 +3349,9 @@
           </a:lstStyle>
           <a:p>
             <a:r>
-              <a:rPr lang="en-US"/>
+              <a:rPr lang="en-US" dirty="0"/>
               <a:t>https://github.com/avifarah/Recurson</a:t>
             </a:r>
-            <a:endParaRPr lang="en-US" dirty="0"/>
           </a:p>
         </p:txBody>
       </p:sp>
@@ -3853,10 +3841,9 @@
           <a:lstStyle/>
           <a:p>
             <a:r>
-              <a:rPr lang="en-US"/>
+              <a:rPr lang="en-US" dirty="0"/>
               <a:t>https://github.com/avifarah/Recurson</a:t>
             </a:r>
-            <a:endParaRPr lang="en-US" dirty="0"/>
           </a:p>
         </p:txBody>
       </p:sp>
@@ -4865,10 +4852,9 @@
           <a:lstStyle/>
           <a:p>
             <a:r>
-              <a:rPr lang="en-US"/>
+              <a:rPr lang="en-US" dirty="0"/>
               <a:t>https://github.com/avifarah/Recurson</a:t>
             </a:r>
-            <a:endParaRPr lang="en-US" dirty="0"/>
           </a:p>
         </p:txBody>
       </p:sp>
@@ -5191,10 +5177,9 @@
           <a:lstStyle/>
           <a:p>
             <a:r>
-              <a:rPr lang="en-US"/>
+              <a:rPr lang="en-US" dirty="0"/>
               <a:t>https://github.com/avifarah/Recurson</a:t>
             </a:r>
-            <a:endParaRPr lang="en-US" dirty="0"/>
           </a:p>
         </p:txBody>
       </p:sp>
@@ -6233,10 +6218,9 @@
           <a:lstStyle/>
           <a:p>
             <a:r>
-              <a:rPr lang="en-US"/>
+              <a:rPr lang="en-US" dirty="0"/>
               <a:t>https://github.com/avifarah/Recurson</a:t>
             </a:r>
-            <a:endParaRPr lang="en-US" dirty="0"/>
           </a:p>
         </p:txBody>
       </p:sp>
@@ -7062,10 +7046,9 @@
           <a:lstStyle/>
           <a:p>
             <a:r>
-              <a:rPr lang="en-US"/>
+              <a:rPr lang="en-US" dirty="0"/>
               <a:t>https://github.com/avifarah/Recurson</a:t>
             </a:r>
-            <a:endParaRPr lang="en-US" dirty="0"/>
           </a:p>
         </p:txBody>
       </p:sp>
@@ -7268,10 +7251,9 @@
           <a:lstStyle/>
           <a:p>
             <a:r>
-              <a:rPr lang="en-US"/>
+              <a:rPr lang="en-US" dirty="0"/>
               <a:t>https://github.com/avifarah/Recurson</a:t>
             </a:r>
-            <a:endParaRPr lang="en-US" dirty="0"/>
           </a:p>
         </p:txBody>
       </p:sp>
@@ -7983,10 +7965,9 @@
           <a:lstStyle/>
           <a:p>
             <a:r>
-              <a:rPr lang="en-US"/>
+              <a:rPr lang="en-US" dirty="0"/>
               <a:t>https://github.com/avifarah/Recurson</a:t>
             </a:r>
-            <a:endParaRPr lang="en-US" dirty="0"/>
           </a:p>
         </p:txBody>
       </p:sp>
@@ -8077,8 +8058,8 @@
         </p:blipFill>
         <p:spPr>
           <a:xfrm>
-            <a:off x="7949004" y="3413769"/>
-            <a:ext cx="1323191" cy="431380"/>
+            <a:off x="8153399" y="3413769"/>
+            <a:ext cx="819779" cy="431380"/>
           </a:xfrm>
           <a:prstGeom prst="rect">
             <a:avLst/>
@@ -8112,8 +8093,8 @@
         </p:blipFill>
         <p:spPr bwMode="auto">
           <a:xfrm rot="10800000">
-            <a:off x="6927921" y="4349808"/>
-            <a:ext cx="1398498" cy="390007"/>
+            <a:off x="7405634" y="4349804"/>
+            <a:ext cx="747763" cy="390007"/>
           </a:xfrm>
           <a:prstGeom prst="rect">
             <a:avLst/>
@@ -8413,10 +8394,9 @@
           <a:lstStyle/>
           <a:p>
             <a:r>
-              <a:rPr lang="en-US"/>
+              <a:rPr lang="en-US" dirty="0"/>
               <a:t>https://github.com/avifarah/Recurson</a:t>
             </a:r>
-            <a:endParaRPr lang="en-US" dirty="0"/>
           </a:p>
         </p:txBody>
       </p:sp>
@@ -9072,10 +9052,9 @@
           <a:lstStyle/>
           <a:p>
             <a:r>
-              <a:rPr lang="en-US"/>
+              <a:rPr lang="en-US" dirty="0"/>
               <a:t>https://github.com/avifarah/Recurson</a:t>
             </a:r>
-            <a:endParaRPr lang="en-US" dirty="0"/>
           </a:p>
         </p:txBody>
       </p:sp>
@@ -10250,10 +10229,9 @@
           <a:lstStyle/>
           <a:p>
             <a:r>
-              <a:rPr lang="en-US"/>
+              <a:rPr lang="en-US" dirty="0"/>
               <a:t>https://github.com/avifarah/Recurson</a:t>
             </a:r>
-            <a:endParaRPr lang="en-US" dirty="0"/>
           </a:p>
         </p:txBody>
       </p:sp>

</xml_diff>